<commit_message>
added mention of SSDT Refactor Tool
</commit_message>
<xml_diff>
--- a/ArchitectZeroDowntime.pptx
+++ b/ArchitectZeroDowntime.pptx
@@ -1000,7 +1000,7 @@
           <a:p>
             <a:fld id="{D088F999-7A4E-6B4F-9FED-EF75B73AD044}" type="datetimeFigureOut">
               <a:rPr lang="en-US" smtClean="0"/>
-              <a:t>5/3/2023</a:t>
+              <a:t>08/05/2023</a:t>
             </a:fld>
             <a:endParaRPr lang="en-US"/>
           </a:p>
@@ -1168,7 +1168,7 @@
           <a:p>
             <a:fld id="{D088F999-7A4E-6B4F-9FED-EF75B73AD044}" type="datetimeFigureOut">
               <a:rPr lang="en-US" smtClean="0"/>
-              <a:t>5/3/2023</a:t>
+              <a:t>08/05/2023</a:t>
             </a:fld>
             <a:endParaRPr lang="en-US"/>
           </a:p>
@@ -1346,7 +1346,7 @@
           <a:p>
             <a:fld id="{D088F999-7A4E-6B4F-9FED-EF75B73AD044}" type="datetimeFigureOut">
               <a:rPr lang="en-US" smtClean="0"/>
-              <a:t>5/3/2023</a:t>
+              <a:t>08/05/2023</a:t>
             </a:fld>
             <a:endParaRPr lang="en-US"/>
           </a:p>
@@ -1586,7 +1586,7 @@
             <a:fld id="{3FE51E94-D08C-431E-88FC-7EB62E529A19}" type="datetimeFigureOut">
               <a:rPr lang="en-US" smtClean="0"/>
               <a:pPr/>
-              <a:t>5/3/2023</a:t>
+              <a:t>08/05/2023</a:t>
             </a:fld>
             <a:endParaRPr lang="en-US"/>
           </a:p>
@@ -1756,7 +1756,7 @@
             <a:fld id="{3FE51E94-D08C-431E-88FC-7EB62E529A19}" type="datetimeFigureOut">
               <a:rPr lang="en-US" smtClean="0"/>
               <a:pPr/>
-              <a:t>5/3/2023</a:t>
+              <a:t>08/05/2023</a:t>
             </a:fld>
             <a:endParaRPr lang="en-US"/>
           </a:p>
@@ -2003,7 +2003,7 @@
             <a:fld id="{3FE51E94-D08C-431E-88FC-7EB62E529A19}" type="datetimeFigureOut">
               <a:rPr lang="en-US" smtClean="0"/>
               <a:pPr/>
-              <a:t>5/3/2023</a:t>
+              <a:t>08/05/2023</a:t>
             </a:fld>
             <a:endParaRPr lang="en-US"/>
           </a:p>
@@ -2290,7 +2290,7 @@
             <a:fld id="{3FE51E94-D08C-431E-88FC-7EB62E529A19}" type="datetimeFigureOut">
               <a:rPr lang="en-US" smtClean="0"/>
               <a:pPr/>
-              <a:t>5/3/2023</a:t>
+              <a:t>08/05/2023</a:t>
             </a:fld>
             <a:endParaRPr lang="en-US"/>
           </a:p>
@@ -2716,7 +2716,7 @@
             <a:fld id="{3FE51E94-D08C-431E-88FC-7EB62E529A19}" type="datetimeFigureOut">
               <a:rPr lang="en-US" smtClean="0"/>
               <a:pPr/>
-              <a:t>5/3/2023</a:t>
+              <a:t>08/05/2023</a:t>
             </a:fld>
             <a:endParaRPr lang="en-US"/>
           </a:p>
@@ -2835,7 +2835,7 @@
             <a:fld id="{3FE51E94-D08C-431E-88FC-7EB62E529A19}" type="datetimeFigureOut">
               <a:rPr lang="en-US" smtClean="0"/>
               <a:pPr/>
-              <a:t>5/3/2023</a:t>
+              <a:t>08/05/2023</a:t>
             </a:fld>
             <a:endParaRPr lang="en-US"/>
           </a:p>
@@ -2932,7 +2932,7 @@
             <a:fld id="{3FE51E94-D08C-431E-88FC-7EB62E529A19}" type="datetimeFigureOut">
               <a:rPr lang="en-US" smtClean="0"/>
               <a:pPr/>
-              <a:t>5/3/2023</a:t>
+              <a:t>08/05/2023</a:t>
             </a:fld>
             <a:endParaRPr lang="en-US"/>
           </a:p>
@@ -3209,7 +3209,7 @@
             <a:fld id="{3FE51E94-D08C-431E-88FC-7EB62E529A19}" type="datetimeFigureOut">
               <a:rPr lang="en-US" smtClean="0"/>
               <a:pPr/>
-              <a:t>5/3/2023</a:t>
+              <a:t>08/05/2023</a:t>
             </a:fld>
             <a:endParaRPr lang="en-US"/>
           </a:p>
@@ -3378,7 +3378,7 @@
           <a:p>
             <a:fld id="{D088F999-7A4E-6B4F-9FED-EF75B73AD044}" type="datetimeFigureOut">
               <a:rPr lang="en-US" smtClean="0"/>
-              <a:t>5/3/2023</a:t>
+              <a:t>08/05/2023</a:t>
             </a:fld>
             <a:endParaRPr lang="en-US"/>
           </a:p>
@@ -3634,7 +3634,7 @@
             <a:fld id="{3FE51E94-D08C-431E-88FC-7EB62E529A19}" type="datetimeFigureOut">
               <a:rPr lang="en-US" smtClean="0"/>
               <a:pPr/>
-              <a:t>5/3/2023</a:t>
+              <a:t>08/05/2023</a:t>
             </a:fld>
             <a:endParaRPr lang="en-US"/>
           </a:p>
@@ -3804,7 +3804,7 @@
             <a:fld id="{3FE51E94-D08C-431E-88FC-7EB62E529A19}" type="datetimeFigureOut">
               <a:rPr lang="en-US" smtClean="0"/>
               <a:pPr/>
-              <a:t>5/3/2023</a:t>
+              <a:t>08/05/2023</a:t>
             </a:fld>
             <a:endParaRPr lang="en-US"/>
           </a:p>
@@ -3984,7 +3984,7 @@
             <a:fld id="{3FE51E94-D08C-431E-88FC-7EB62E529A19}" type="datetimeFigureOut">
               <a:rPr lang="en-US" smtClean="0"/>
               <a:pPr/>
-              <a:t>5/3/2023</a:t>
+              <a:t>08/05/2023</a:t>
             </a:fld>
             <a:endParaRPr lang="en-US"/>
           </a:p>
@@ -4281,7 +4281,7 @@
           <a:p>
             <a:fld id="{D088F999-7A4E-6B4F-9FED-EF75B73AD044}" type="datetimeFigureOut">
               <a:rPr lang="en-US" smtClean="0"/>
-              <a:t>5/3/2023</a:t>
+              <a:t>08/05/2023</a:t>
             </a:fld>
             <a:endParaRPr lang="en-US"/>
           </a:p>
@@ -4449,7 +4449,7 @@
           <a:p>
             <a:fld id="{D088F999-7A4E-6B4F-9FED-EF75B73AD044}" type="datetimeFigureOut">
               <a:rPr lang="en-US" smtClean="0"/>
-              <a:t>5/3/2023</a:t>
+              <a:t>08/05/2023</a:t>
             </a:fld>
             <a:endParaRPr lang="en-US"/>
           </a:p>
@@ -4941,7 +4941,7 @@
           <a:p>
             <a:fld id="{D088F999-7A4E-6B4F-9FED-EF75B73AD044}" type="datetimeFigureOut">
               <a:rPr lang="en-US" smtClean="0"/>
-              <a:t>5/3/2023</a:t>
+              <a:t>08/05/2023</a:t>
             </a:fld>
             <a:endParaRPr lang="en-US"/>
           </a:p>
@@ -5360,7 +5360,7 @@
           <a:p>
             <a:fld id="{D088F999-7A4E-6B4F-9FED-EF75B73AD044}" type="datetimeFigureOut">
               <a:rPr lang="en-US" smtClean="0"/>
-              <a:t>5/3/2023</a:t>
+              <a:t>08/05/2023</a:t>
             </a:fld>
             <a:endParaRPr lang="en-US"/>
           </a:p>
@@ -5477,7 +5477,7 @@
           <a:p>
             <a:fld id="{D088F999-7A4E-6B4F-9FED-EF75B73AD044}" type="datetimeFigureOut">
               <a:rPr lang="en-US" smtClean="0"/>
-              <a:t>5/3/2023</a:t>
+              <a:t>08/05/2023</a:t>
             </a:fld>
             <a:endParaRPr lang="en-US"/>
           </a:p>
@@ -5722,7 +5722,7 @@
           <a:p>
             <a:fld id="{D088F999-7A4E-6B4F-9FED-EF75B73AD044}" type="datetimeFigureOut">
               <a:rPr lang="en-US" smtClean="0"/>
-              <a:t>5/3/2023</a:t>
+              <a:t>08/05/2023</a:t>
             </a:fld>
             <a:endParaRPr lang="en-US"/>
           </a:p>
@@ -5817,7 +5817,7 @@
           <a:p>
             <a:fld id="{D088F999-7A4E-6B4F-9FED-EF75B73AD044}" type="datetimeFigureOut">
               <a:rPr lang="en-US" smtClean="0"/>
-              <a:t>5/3/2023</a:t>
+              <a:t>08/05/2023</a:t>
             </a:fld>
             <a:endParaRPr lang="en-US"/>
           </a:p>
@@ -6092,7 +6092,7 @@
           <a:p>
             <a:fld id="{D088F999-7A4E-6B4F-9FED-EF75B73AD044}" type="datetimeFigureOut">
               <a:rPr lang="en-US" smtClean="0"/>
-              <a:t>5/3/2023</a:t>
+              <a:t>08/05/2023</a:t>
             </a:fld>
             <a:endParaRPr lang="en-US"/>
           </a:p>
@@ -6347,7 +6347,7 @@
           <a:p>
             <a:fld id="{D088F999-7A4E-6B4F-9FED-EF75B73AD044}" type="datetimeFigureOut">
               <a:rPr lang="en-US" smtClean="0"/>
-              <a:t>5/3/2023</a:t>
+              <a:t>08/05/2023</a:t>
             </a:fld>
             <a:endParaRPr lang="en-US"/>
           </a:p>
@@ -6515,7 +6515,7 @@
           <a:p>
             <a:fld id="{D088F999-7A4E-6B4F-9FED-EF75B73AD044}" type="datetimeFigureOut">
               <a:rPr lang="en-US" smtClean="0"/>
-              <a:t>5/3/2023</a:t>
+              <a:t>08/05/2023</a:t>
             </a:fld>
             <a:endParaRPr lang="en-US"/>
           </a:p>
@@ -6693,7 +6693,7 @@
           <a:p>
             <a:fld id="{D088F999-7A4E-6B4F-9FED-EF75B73AD044}" type="datetimeFigureOut">
               <a:rPr lang="en-US" smtClean="0"/>
-              <a:t>5/3/2023</a:t>
+              <a:t>08/05/2023</a:t>
             </a:fld>
             <a:endParaRPr lang="en-US"/>
           </a:p>
@@ -6934,7 +6934,7 @@
             <a:fld id="{3FE51E94-D08C-431E-88FC-7EB62E529A19}" type="datetimeFigureOut">
               <a:rPr lang="en-US" smtClean="0"/>
               <a:pPr/>
-              <a:t>5/3/2023</a:t>
+              <a:t>08/05/2023</a:t>
             </a:fld>
             <a:endParaRPr lang="en-US"/>
           </a:p>
@@ -7104,7 +7104,7 @@
             <a:fld id="{3FE51E94-D08C-431E-88FC-7EB62E529A19}" type="datetimeFigureOut">
               <a:rPr lang="en-US" smtClean="0"/>
               <a:pPr/>
-              <a:t>5/3/2023</a:t>
+              <a:t>08/05/2023</a:t>
             </a:fld>
             <a:endParaRPr lang="en-US"/>
           </a:p>
@@ -7351,7 +7351,7 @@
             <a:fld id="{3FE51E94-D08C-431E-88FC-7EB62E529A19}" type="datetimeFigureOut">
               <a:rPr lang="en-US" smtClean="0"/>
               <a:pPr/>
-              <a:t>5/3/2023</a:t>
+              <a:t>08/05/2023</a:t>
             </a:fld>
             <a:endParaRPr lang="en-US"/>
           </a:p>
@@ -7638,7 +7638,7 @@
             <a:fld id="{3FE51E94-D08C-431E-88FC-7EB62E529A19}" type="datetimeFigureOut">
               <a:rPr lang="en-US" smtClean="0"/>
               <a:pPr/>
-              <a:t>5/3/2023</a:t>
+              <a:t>08/05/2023</a:t>
             </a:fld>
             <a:endParaRPr lang="en-US"/>
           </a:p>
@@ -8059,7 +8059,7 @@
             <a:fld id="{3FE51E94-D08C-431E-88FC-7EB62E529A19}" type="datetimeFigureOut">
               <a:rPr lang="en-US" smtClean="0"/>
               <a:pPr/>
-              <a:t>5/3/2023</a:t>
+              <a:t>08/05/2023</a:t>
             </a:fld>
             <a:endParaRPr lang="en-US"/>
           </a:p>
@@ -8345,7 +8345,7 @@
           <a:p>
             <a:fld id="{D088F999-7A4E-6B4F-9FED-EF75B73AD044}" type="datetimeFigureOut">
               <a:rPr lang="en-US" smtClean="0"/>
-              <a:t>5/3/2023</a:t>
+              <a:t>08/05/2023</a:t>
             </a:fld>
             <a:endParaRPr lang="en-US"/>
           </a:p>
@@ -8463,7 +8463,7 @@
             <a:fld id="{3FE51E94-D08C-431E-88FC-7EB62E529A19}" type="datetimeFigureOut">
               <a:rPr lang="en-US" smtClean="0"/>
               <a:pPr/>
-              <a:t>5/3/2023</a:t>
+              <a:t>08/05/2023</a:t>
             </a:fld>
             <a:endParaRPr lang="en-US"/>
           </a:p>
@@ -8560,7 +8560,7 @@
             <a:fld id="{3FE51E94-D08C-431E-88FC-7EB62E529A19}" type="datetimeFigureOut">
               <a:rPr lang="en-US" smtClean="0"/>
               <a:pPr/>
-              <a:t>5/3/2023</a:t>
+              <a:t>08/05/2023</a:t>
             </a:fld>
             <a:endParaRPr lang="en-US"/>
           </a:p>
@@ -8837,7 +8837,7 @@
             <a:fld id="{3FE51E94-D08C-431E-88FC-7EB62E529A19}" type="datetimeFigureOut">
               <a:rPr lang="en-US" smtClean="0"/>
               <a:pPr/>
-              <a:t>5/3/2023</a:t>
+              <a:t>08/05/2023</a:t>
             </a:fld>
             <a:endParaRPr lang="en-US"/>
           </a:p>
@@ -9094,7 +9094,7 @@
             <a:fld id="{3FE51E94-D08C-431E-88FC-7EB62E529A19}" type="datetimeFigureOut">
               <a:rPr lang="en-US" smtClean="0"/>
               <a:pPr/>
-              <a:t>5/3/2023</a:t>
+              <a:t>08/05/2023</a:t>
             </a:fld>
             <a:endParaRPr lang="en-US"/>
           </a:p>
@@ -9264,7 +9264,7 @@
             <a:fld id="{3FE51E94-D08C-431E-88FC-7EB62E529A19}" type="datetimeFigureOut">
               <a:rPr lang="en-US" smtClean="0"/>
               <a:pPr/>
-              <a:t>5/3/2023</a:t>
+              <a:t>08/05/2023</a:t>
             </a:fld>
             <a:endParaRPr lang="en-US"/>
           </a:p>
@@ -9444,7 +9444,7 @@
             <a:fld id="{3FE51E94-D08C-431E-88FC-7EB62E529A19}" type="datetimeFigureOut">
               <a:rPr lang="en-US" smtClean="0"/>
               <a:pPr/>
-              <a:t>5/3/2023</a:t>
+              <a:t>08/05/2023</a:t>
             </a:fld>
             <a:endParaRPr lang="en-US"/>
           </a:p>
@@ -9700,7 +9700,7 @@
             <a:fld id="{3FE51E94-D08C-431E-88FC-7EB62E529A19}" type="datetimeFigureOut">
               <a:rPr lang="en-US" smtClean="0"/>
               <a:pPr/>
-              <a:t>5/3/2023</a:t>
+              <a:t>08/05/2023</a:t>
             </a:fld>
             <a:endParaRPr lang="en-US"/>
           </a:p>
@@ -9870,7 +9870,7 @@
             <a:fld id="{3FE51E94-D08C-431E-88FC-7EB62E529A19}" type="datetimeFigureOut">
               <a:rPr lang="en-US" smtClean="0"/>
               <a:pPr/>
-              <a:t>5/3/2023</a:t>
+              <a:t>08/05/2023</a:t>
             </a:fld>
             <a:endParaRPr lang="en-US"/>
           </a:p>
@@ -10117,7 +10117,7 @@
             <a:fld id="{3FE51E94-D08C-431E-88FC-7EB62E529A19}" type="datetimeFigureOut">
               <a:rPr lang="en-US" smtClean="0"/>
               <a:pPr/>
-              <a:t>5/3/2023</a:t>
+              <a:t>08/05/2023</a:t>
             </a:fld>
             <a:endParaRPr lang="en-US"/>
           </a:p>
@@ -10404,7 +10404,7 @@
             <a:fld id="{3FE51E94-D08C-431E-88FC-7EB62E529A19}" type="datetimeFigureOut">
               <a:rPr lang="en-US" smtClean="0"/>
               <a:pPr/>
-              <a:t>5/3/2023</a:t>
+              <a:t>08/05/2023</a:t>
             </a:fld>
             <a:endParaRPr lang="en-US"/>
           </a:p>
@@ -10824,7 +10824,7 @@
           <a:p>
             <a:fld id="{D088F999-7A4E-6B4F-9FED-EF75B73AD044}" type="datetimeFigureOut">
               <a:rPr lang="en-US" smtClean="0"/>
-              <a:t>5/3/2023</a:t>
+              <a:t>08/05/2023</a:t>
             </a:fld>
             <a:endParaRPr lang="en-US"/>
           </a:p>
@@ -11244,7 +11244,7 @@
             <a:fld id="{3FE51E94-D08C-431E-88FC-7EB62E529A19}" type="datetimeFigureOut">
               <a:rPr lang="en-US" smtClean="0"/>
               <a:pPr/>
-              <a:t>5/3/2023</a:t>
+              <a:t>08/05/2023</a:t>
             </a:fld>
             <a:endParaRPr lang="en-US"/>
           </a:p>
@@ -11363,7 +11363,7 @@
             <a:fld id="{3FE51E94-D08C-431E-88FC-7EB62E529A19}" type="datetimeFigureOut">
               <a:rPr lang="en-US" smtClean="0"/>
               <a:pPr/>
-              <a:t>5/3/2023</a:t>
+              <a:t>08/05/2023</a:t>
             </a:fld>
             <a:endParaRPr lang="en-US"/>
           </a:p>
@@ -11460,7 +11460,7 @@
             <a:fld id="{3FE51E94-D08C-431E-88FC-7EB62E529A19}" type="datetimeFigureOut">
               <a:rPr lang="en-US" smtClean="0"/>
               <a:pPr/>
-              <a:t>5/3/2023</a:t>
+              <a:t>08/05/2023</a:t>
             </a:fld>
             <a:endParaRPr lang="en-US"/>
           </a:p>
@@ -11737,7 +11737,7 @@
             <a:fld id="{3FE51E94-D08C-431E-88FC-7EB62E529A19}" type="datetimeFigureOut">
               <a:rPr lang="en-US" smtClean="0"/>
               <a:pPr/>
-              <a:t>5/3/2023</a:t>
+              <a:t>08/05/2023</a:t>
             </a:fld>
             <a:endParaRPr lang="en-US"/>
           </a:p>
@@ -11994,7 +11994,7 @@
             <a:fld id="{3FE51E94-D08C-431E-88FC-7EB62E529A19}" type="datetimeFigureOut">
               <a:rPr lang="en-US" smtClean="0"/>
               <a:pPr/>
-              <a:t>5/3/2023</a:t>
+              <a:t>08/05/2023</a:t>
             </a:fld>
             <a:endParaRPr lang="en-US"/>
           </a:p>
@@ -12164,7 +12164,7 @@
             <a:fld id="{3FE51E94-D08C-431E-88FC-7EB62E529A19}" type="datetimeFigureOut">
               <a:rPr lang="en-US" smtClean="0"/>
               <a:pPr/>
-              <a:t>5/3/2023</a:t>
+              <a:t>08/05/2023</a:t>
             </a:fld>
             <a:endParaRPr lang="en-US"/>
           </a:p>
@@ -12344,7 +12344,7 @@
             <a:fld id="{3FE51E94-D08C-431E-88FC-7EB62E529A19}" type="datetimeFigureOut">
               <a:rPr lang="en-US" smtClean="0"/>
               <a:pPr/>
-              <a:t>5/3/2023</a:t>
+              <a:t>08/05/2023</a:t>
             </a:fld>
             <a:endParaRPr lang="en-US"/>
           </a:p>
@@ -12462,7 +12462,7 @@
           <a:p>
             <a:fld id="{D088F999-7A4E-6B4F-9FED-EF75B73AD044}" type="datetimeFigureOut">
               <a:rPr lang="en-US" smtClean="0"/>
-              <a:t>5/3/2023</a:t>
+              <a:t>08/05/2023</a:t>
             </a:fld>
             <a:endParaRPr lang="en-US"/>
           </a:p>
@@ -12557,7 +12557,7 @@
           <a:p>
             <a:fld id="{D088F999-7A4E-6B4F-9FED-EF75B73AD044}" type="datetimeFigureOut">
               <a:rPr lang="en-US" smtClean="0"/>
-              <a:t>5/3/2023</a:t>
+              <a:t>08/05/2023</a:t>
             </a:fld>
             <a:endParaRPr lang="en-US"/>
           </a:p>
@@ -12832,7 +12832,7 @@
           <a:p>
             <a:fld id="{D088F999-7A4E-6B4F-9FED-EF75B73AD044}" type="datetimeFigureOut">
               <a:rPr lang="en-US" smtClean="0"/>
-              <a:t>5/3/2023</a:t>
+              <a:t>08/05/2023</a:t>
             </a:fld>
             <a:endParaRPr lang="en-US"/>
           </a:p>
@@ -13084,7 +13084,7 @@
           <a:p>
             <a:fld id="{D088F999-7A4E-6B4F-9FED-EF75B73AD044}" type="datetimeFigureOut">
               <a:rPr lang="en-US" smtClean="0"/>
-              <a:t>5/3/2023</a:t>
+              <a:t>08/05/2023</a:t>
             </a:fld>
             <a:endParaRPr lang="en-US"/>
           </a:p>
@@ -13304,7 +13304,7 @@
           <a:p>
             <a:fld id="{D088F999-7A4E-6B4F-9FED-EF75B73AD044}" type="datetimeFigureOut">
               <a:rPr lang="en-US" smtClean="0"/>
-              <a:t>5/3/2023</a:t>
+              <a:t>08/05/2023</a:t>
             </a:fld>
             <a:endParaRPr lang="en-US"/>
           </a:p>
@@ -13824,7 +13824,7 @@
             <a:fld id="{3FE51E94-D08C-431E-88FC-7EB62E529A19}" type="datetimeFigureOut">
               <a:rPr lang="en-US" smtClean="0"/>
               <a:pPr/>
-              <a:t>5/3/2023</a:t>
+              <a:t>08/05/2023</a:t>
             </a:fld>
             <a:endParaRPr lang="en-US"/>
           </a:p>
@@ -14343,7 +14343,7 @@
           <a:p>
             <a:fld id="{D088F999-7A4E-6B4F-9FED-EF75B73AD044}" type="datetimeFigureOut">
               <a:rPr lang="en-US" smtClean="0"/>
-              <a:t>5/3/2023</a:t>
+              <a:t>08/05/2023</a:t>
             </a:fld>
             <a:endParaRPr lang="en-US"/>
           </a:p>
@@ -14860,7 +14860,7 @@
           <a:p>
             <a:fld id="{D088F999-7A4E-6B4F-9FED-EF75B73AD044}" type="datetimeFigureOut">
               <a:rPr lang="en-US" smtClean="0"/>
-              <a:t>5/3/2023</a:t>
+              <a:t>08/05/2023</a:t>
             </a:fld>
             <a:endParaRPr lang="en-US"/>
           </a:p>
@@ -15377,7 +15377,7 @@
           <a:p>
             <a:fld id="{D088F999-7A4E-6B4F-9FED-EF75B73AD044}" type="datetimeFigureOut">
               <a:rPr lang="en-US" smtClean="0"/>
-              <a:t>5/3/2023</a:t>
+              <a:t>08/05/2023</a:t>
             </a:fld>
             <a:endParaRPr lang="en-US"/>
           </a:p>
@@ -15970,7 +15970,7 @@
                 <a:ea typeface="Roboto Regular" panose="02000000000000000000" pitchFamily="2" charset="0"/>
                 <a:cs typeface="Roboto Regular" panose="02000000000000000000" pitchFamily="2" charset="0"/>
               </a:rPr>
-              <a:t>NO RENAMES (use expand / contract for this)</a:t>
+              <a:t>NO RENAMES (use expand / contract for this, or SSDT Refactor)</a:t>
             </a:r>
           </a:p>
           <a:p>
@@ -16012,29 +16012,8 @@
                 <a:ea typeface="Roboto Regular" panose="02000000000000000000" pitchFamily="2" charset="0"/>
                 <a:cs typeface="Roboto Regular" panose="02000000000000000000" pitchFamily="2" charset="0"/>
               </a:rPr>
-              <a:t>Name </a:t>
-            </a:r>
-            <a:r>
-              <a:rPr lang="en-GB" sz="2400">
-                <a:solidFill>
-                  <a:schemeClr val="bg2">
-                    <a:lumMod val="10000"/>
-                  </a:schemeClr>
-                </a:solidFill>
-                <a:ea typeface="Roboto Regular" panose="02000000000000000000" pitchFamily="2" charset="0"/>
-                <a:cs typeface="Roboto Regular" panose="02000000000000000000" pitchFamily="2" charset="0"/>
-              </a:rPr>
-              <a:t>all parameters</a:t>
-            </a:r>
-            <a:endParaRPr lang="en-GB" sz="2400" dirty="0">
-              <a:solidFill>
-                <a:schemeClr val="bg2">
-                  <a:lumMod val="10000"/>
-                </a:schemeClr>
-              </a:solidFill>
-              <a:ea typeface="Roboto Regular" panose="02000000000000000000" pitchFamily="2" charset="0"/>
-              <a:cs typeface="Roboto Regular" panose="02000000000000000000" pitchFamily="2" charset="0"/>
-            </a:endParaRPr>
+              <a:t>Name all parameters</a:t>
+            </a:r>
           </a:p>
           <a:p>
             <a:pPr marL="685800" lvl="1" indent="-342900">
@@ -16054,7 +16033,7 @@
                 <a:ea typeface="Roboto Regular" panose="02000000000000000000" pitchFamily="2" charset="0"/>
                 <a:cs typeface="Roboto Regular" panose="02000000000000000000" pitchFamily="2" charset="0"/>
               </a:rPr>
-              <a:t>All new columns need defaults</a:t>
+              <a:t>All new columns need defaults and/or be nullable</a:t>
             </a:r>
           </a:p>
           <a:p>
@@ -17919,7 +17898,7 @@
                 <a:latin typeface="Calibri" panose="020F0502020204030204" pitchFamily="34" charset="0"/>
                 <a:cs typeface="Calibri" panose="020F0502020204030204" pitchFamily="34" charset="0"/>
               </a:rPr>
-              <a:t>)</a:t>
+              <a:t>) (SSDT Refactor)</a:t>
             </a:r>
           </a:p>
           <a:p>
@@ -18179,9 +18158,16 @@
             </a:r>
           </a:p>
           <a:p>
+            <a:pPr lvl="1"/>
             <a:r>
               <a:rPr lang="en-US" dirty="0"/>
-              <a:t>Safer process is:</a:t>
+              <a:t>Very easy to do with Refactor Tool in SSDT</a:t>
+            </a:r>
+          </a:p>
+          <a:p>
+            <a:r>
+              <a:rPr lang="en-US" dirty="0"/>
+              <a:t>Alternative process:</a:t>
             </a:r>
           </a:p>
           <a:p>
@@ -18460,14 +18446,14 @@
           </a:ln>
           <a:extLst>
             <a:ext uri="{909E8E84-426E-40dd-AFC4-6F175D3DCCD1}">
-              <a14:hiddenFill xmlns:a14="http://schemas.microsoft.com/office/drawing/2010/main" xmlns="">
+              <a14:hiddenFill xmlns="" xmlns:a14="http://schemas.microsoft.com/office/drawing/2010/main">
                 <a:solidFill>
                   <a:srgbClr val="FFFFFF"/>
                 </a:solidFill>
               </a14:hiddenFill>
             </a:ext>
             <a:ext uri="{91240B29-F687-4f45-9708-019B960494DF}">
-              <a14:hiddenLine xmlns:a14="http://schemas.microsoft.com/office/drawing/2010/main" xmlns="" w="9525">
+              <a14:hiddenLine xmlns="" xmlns:a14="http://schemas.microsoft.com/office/drawing/2010/main" w="9525">
                 <a:solidFill>
                   <a:srgbClr val="000000"/>
                 </a:solidFill>
@@ -21013,7 +20999,12 @@
             <p:ph idx="1"/>
           </p:nvPr>
         </p:nvSpPr>
-        <p:spPr/>
+        <p:spPr>
+          <a:xfrm>
+            <a:off x="457200" y="1200150"/>
+            <a:ext cx="8229600" cy="3736975"/>
+          </a:xfrm>
+        </p:spPr>
         <p:txBody>
           <a:bodyPr>
             <a:normAutofit fontScale="70000" lnSpcReduction="20000"/>
@@ -21050,6 +21041,13 @@
             <a:r>
               <a:rPr lang="en-US" dirty="0"/>
               <a:t>No numbers for columns</a:t>
+            </a:r>
+          </a:p>
+          <a:p>
+            <a:pPr lvl="1"/>
+            <a:r>
+              <a:rPr lang="en-US" dirty="0"/>
+              <a:t>Easy to do with the Refactor Tool in SSDT (“Expand Wildcards”)</a:t>
             </a:r>
           </a:p>
           <a:p>
@@ -21279,7 +21277,12 @@
             <p:ph idx="1"/>
           </p:nvPr>
         </p:nvSpPr>
-        <p:spPr/>
+        <p:spPr>
+          <a:xfrm>
+            <a:off x="457200" y="1200150"/>
+            <a:ext cx="8229600" cy="3736975"/>
+          </a:xfrm>
+        </p:spPr>
         <p:txBody>
           <a:bodyPr>
             <a:normAutofit fontScale="85000" lnSpcReduction="10000"/>
@@ -21314,15 +21317,14 @@
             <a:pPr lvl="1"/>
             <a:r>
               <a:rPr lang="en-US" dirty="0"/>
-              <a:t>Make a </a:t>
-            </a:r>
-            <a:r>
-              <a:rPr lang="en-US"/>
-              <a:t>separate branch/PR </a:t>
-            </a:r>
+              <a:t>Make a separate branch/PR with a FUTURE DATE for deployment</a:t>
+            </a:r>
+          </a:p>
+          <a:p>
+            <a:pPr lvl="1"/>
             <a:r>
               <a:rPr lang="en-US" dirty="0"/>
-              <a:t>with a FUTURE DATE for deployment</a:t>
+              <a:t>Easy to generate using Red-Gate Flyway</a:t>
             </a:r>
           </a:p>
         </p:txBody>
@@ -26025,4 +26027,264 @@
   <a:objectDefaults/>
   <a:extraClrSchemeLst/>
 </a:theme>
+</file>
+
+<file path=customXml/item1.xml><?xml version="1.0" encoding="utf-8"?>
+<ct:contentTypeSchema xmlns:ct="http://schemas.microsoft.com/office/2006/metadata/contentType" xmlns:ma="http://schemas.microsoft.com/office/2006/metadata/properties/metaAttributes" ct:_="" ma:_="" ma:contentTypeName="Document" ma:contentTypeID="0x010100A0B9F8B3991C594AB7A558D53E9A462C" ma:contentTypeVersion="16" ma:contentTypeDescription="Create a new document." ma:contentTypeScope="" ma:versionID="94f7033f07b48140e4e9e407db379254">
+  <xsd:schema xmlns:xsd="http://www.w3.org/2001/XMLSchema" xmlns:xs="http://www.w3.org/2001/XMLSchema" xmlns:p="http://schemas.microsoft.com/office/2006/metadata/properties" xmlns:ns2="1c853891-79e1-4665-8425-27cfb243d1fd" xmlns:ns3="c8f11c67-c3b6-4b83-8087-70e71e9ec41f" targetNamespace="http://schemas.microsoft.com/office/2006/metadata/properties" ma:root="true" ma:fieldsID="51e63efaace8fc189d6558b857620248" ns2:_="" ns3:_="">
+    <xsd:import namespace="1c853891-79e1-4665-8425-27cfb243d1fd"/>
+    <xsd:import namespace="c8f11c67-c3b6-4b83-8087-70e71e9ec41f"/>
+    <xsd:element name="properties">
+      <xsd:complexType>
+        <xsd:sequence>
+          <xsd:element name="documentManagement">
+            <xsd:complexType>
+              <xsd:all>
+                <xsd:element ref="ns2:MediaServiceMetadata" minOccurs="0"/>
+                <xsd:element ref="ns2:MediaServiceFastMetadata" minOccurs="0"/>
+                <xsd:element ref="ns2:MediaServiceAutoTags" minOccurs="0"/>
+                <xsd:element ref="ns2:MediaServiceOCR" minOccurs="0"/>
+                <xsd:element ref="ns2:MediaServiceDateTaken" minOccurs="0"/>
+                <xsd:element ref="ns2:MediaServiceLocation" minOccurs="0"/>
+                <xsd:element ref="ns2:MediaServiceGenerationTime" minOccurs="0"/>
+                <xsd:element ref="ns2:MediaServiceEventHashCode" minOccurs="0"/>
+                <xsd:element ref="ns3:SharedWithUsers" minOccurs="0"/>
+                <xsd:element ref="ns3:SharedWithDetails" minOccurs="0"/>
+                <xsd:element ref="ns2:MediaServiceAutoKeyPoints" minOccurs="0"/>
+                <xsd:element ref="ns2:MediaServiceKeyPoints" minOccurs="0"/>
+                <xsd:element ref="ns2:MediaLengthInSeconds" minOccurs="0"/>
+                <xsd:element ref="ns2:lcf76f155ced4ddcb4097134ff3c332f" minOccurs="0"/>
+                <xsd:element ref="ns3:TaxCatchAll" minOccurs="0"/>
+              </xsd:all>
+            </xsd:complexType>
+          </xsd:element>
+        </xsd:sequence>
+      </xsd:complexType>
+    </xsd:element>
+  </xsd:schema>
+  <xsd:schema xmlns:xsd="http://www.w3.org/2001/XMLSchema" xmlns:xs="http://www.w3.org/2001/XMLSchema" xmlns:dms="http://schemas.microsoft.com/office/2006/documentManagement/types" xmlns:pc="http://schemas.microsoft.com/office/infopath/2007/PartnerControls" targetNamespace="1c853891-79e1-4665-8425-27cfb243d1fd" elementFormDefault="qualified">
+    <xsd:import namespace="http://schemas.microsoft.com/office/2006/documentManagement/types"/>
+    <xsd:import namespace="http://schemas.microsoft.com/office/infopath/2007/PartnerControls"/>
+    <xsd:element name="MediaServiceMetadata" ma:index="8" nillable="true" ma:displayName="MediaServiceMetadata" ma:hidden="true" ma:internalName="MediaServiceMetadata" ma:readOnly="true">
+      <xsd:simpleType>
+        <xsd:restriction base="dms:Note"/>
+      </xsd:simpleType>
+    </xsd:element>
+    <xsd:element name="MediaServiceFastMetadata" ma:index="9" nillable="true" ma:displayName="MediaServiceFastMetadata" ma:hidden="true" ma:internalName="MediaServiceFastMetadata" ma:readOnly="true">
+      <xsd:simpleType>
+        <xsd:restriction base="dms:Note"/>
+      </xsd:simpleType>
+    </xsd:element>
+    <xsd:element name="MediaServiceAutoTags" ma:index="10" nillable="true" ma:displayName="Tags" ma:internalName="MediaServiceAutoTags" ma:readOnly="true">
+      <xsd:simpleType>
+        <xsd:restriction base="dms:Text"/>
+      </xsd:simpleType>
+    </xsd:element>
+    <xsd:element name="MediaServiceOCR" ma:index="11" nillable="true" ma:displayName="Extracted Text" ma:internalName="MediaServiceOCR" ma:readOnly="true">
+      <xsd:simpleType>
+        <xsd:restriction base="dms:Note">
+          <xsd:maxLength value="255"/>
+        </xsd:restriction>
+      </xsd:simpleType>
+    </xsd:element>
+    <xsd:element name="MediaServiceDateTaken" ma:index="12" nillable="true" ma:displayName="MediaServiceDateTaken" ma:hidden="true" ma:internalName="MediaServiceDateTaken" ma:readOnly="true">
+      <xsd:simpleType>
+        <xsd:restriction base="dms:Text"/>
+      </xsd:simpleType>
+    </xsd:element>
+    <xsd:element name="MediaServiceLocation" ma:index="13" nillable="true" ma:displayName="Location" ma:internalName="MediaServiceLocation" ma:readOnly="true">
+      <xsd:simpleType>
+        <xsd:restriction base="dms:Text"/>
+      </xsd:simpleType>
+    </xsd:element>
+    <xsd:element name="MediaServiceGenerationTime" ma:index="14" nillable="true" ma:displayName="MediaServiceGenerationTime" ma:hidden="true" ma:internalName="MediaServiceGenerationTime" ma:readOnly="true">
+      <xsd:simpleType>
+        <xsd:restriction base="dms:Text"/>
+      </xsd:simpleType>
+    </xsd:element>
+    <xsd:element name="MediaServiceEventHashCode" ma:index="15" nillable="true" ma:displayName="MediaServiceEventHashCode" ma:hidden="true" ma:internalName="MediaServiceEventHashCode" ma:readOnly="true">
+      <xsd:simpleType>
+        <xsd:restriction base="dms:Text"/>
+      </xsd:simpleType>
+    </xsd:element>
+    <xsd:element name="MediaServiceAutoKeyPoints" ma:index="18" nillable="true" ma:displayName="MediaServiceAutoKeyPoints" ma:hidden="true" ma:internalName="MediaServiceAutoKeyPoints" ma:readOnly="true">
+      <xsd:simpleType>
+        <xsd:restriction base="dms:Note"/>
+      </xsd:simpleType>
+    </xsd:element>
+    <xsd:element name="MediaServiceKeyPoints" ma:index="19" nillable="true" ma:displayName="KeyPoints" ma:internalName="MediaServiceKeyPoints" ma:readOnly="true">
+      <xsd:simpleType>
+        <xsd:restriction base="dms:Note">
+          <xsd:maxLength value="255"/>
+        </xsd:restriction>
+      </xsd:simpleType>
+    </xsd:element>
+    <xsd:element name="MediaLengthInSeconds" ma:index="20" nillable="true" ma:displayName="Length (seconds)" ma:internalName="MediaLengthInSeconds" ma:readOnly="true">
+      <xsd:simpleType>
+        <xsd:restriction base="dms:Unknown"/>
+      </xsd:simpleType>
+    </xsd:element>
+    <xsd:element name="lcf76f155ced4ddcb4097134ff3c332f" ma:index="22" nillable="true" ma:taxonomy="true" ma:internalName="lcf76f155ced4ddcb4097134ff3c332f" ma:taxonomyFieldName="MediaServiceImageTags" ma:displayName="Image Tags" ma:readOnly="false" ma:fieldId="{5cf76f15-5ced-4ddc-b409-7134ff3c332f}" ma:taxonomyMulti="true" ma:sspId="55958d9d-b972-40cf-abaf-fbc3505d5eda" ma:termSetId="09814cd3-568e-fe90-9814-8d621ff8fb84" ma:anchorId="fba54fb3-c3e1-fe81-a776-ca4b69148c4d" ma:open="true" ma:isKeyword="false">
+      <xsd:complexType>
+        <xsd:sequence>
+          <xsd:element ref="pc:Terms" minOccurs="0" maxOccurs="1"/>
+        </xsd:sequence>
+      </xsd:complexType>
+    </xsd:element>
+  </xsd:schema>
+  <xsd:schema xmlns:xsd="http://www.w3.org/2001/XMLSchema" xmlns:xs="http://www.w3.org/2001/XMLSchema" xmlns:dms="http://schemas.microsoft.com/office/2006/documentManagement/types" xmlns:pc="http://schemas.microsoft.com/office/infopath/2007/PartnerControls" targetNamespace="c8f11c67-c3b6-4b83-8087-70e71e9ec41f" elementFormDefault="qualified">
+    <xsd:import namespace="http://schemas.microsoft.com/office/2006/documentManagement/types"/>
+    <xsd:import namespace="http://schemas.microsoft.com/office/infopath/2007/PartnerControls"/>
+    <xsd:element name="SharedWithUsers" ma:index="16" nillable="true" ma:displayName="Shared With" ma:internalName="SharedWithUsers" ma:readOnly="true">
+      <xsd:complexType>
+        <xsd:complexContent>
+          <xsd:extension base="dms:UserMulti">
+            <xsd:sequence>
+              <xsd:element name="UserInfo" minOccurs="0" maxOccurs="unbounded">
+                <xsd:complexType>
+                  <xsd:sequence>
+                    <xsd:element name="DisplayName" type="xsd:string" minOccurs="0"/>
+                    <xsd:element name="AccountId" type="dms:UserId" minOccurs="0" nillable="true"/>
+                    <xsd:element name="AccountType" type="xsd:string" minOccurs="0"/>
+                  </xsd:sequence>
+                </xsd:complexType>
+              </xsd:element>
+            </xsd:sequence>
+          </xsd:extension>
+        </xsd:complexContent>
+      </xsd:complexType>
+    </xsd:element>
+    <xsd:element name="SharedWithDetails" ma:index="17" nillable="true" ma:displayName="Shared With Details" ma:internalName="SharedWithDetails" ma:readOnly="true">
+      <xsd:simpleType>
+        <xsd:restriction base="dms:Note">
+          <xsd:maxLength value="255"/>
+        </xsd:restriction>
+      </xsd:simpleType>
+    </xsd:element>
+    <xsd:element name="TaxCatchAll" ma:index="23" nillable="true" ma:displayName="Taxonomy Catch All Column" ma:hidden="true" ma:list="{965b0f2e-68b2-45e7-8293-65271e337cba}" ma:internalName="TaxCatchAll" ma:showField="CatchAllData" ma:web="c8f11c67-c3b6-4b83-8087-70e71e9ec41f">
+      <xsd:complexType>
+        <xsd:complexContent>
+          <xsd:extension base="dms:MultiChoiceLookup">
+            <xsd:sequence>
+              <xsd:element name="Value" type="dms:Lookup" maxOccurs="unbounded" minOccurs="0" nillable="true"/>
+            </xsd:sequence>
+          </xsd:extension>
+        </xsd:complexContent>
+      </xsd:complexType>
+    </xsd:element>
+  </xsd:schema>
+  <xsd:schema xmlns="http://schemas.openxmlformats.org/package/2006/metadata/core-properties" xmlns:xsd="http://www.w3.org/2001/XMLSchema" xmlns:xsi="http://www.w3.org/2001/XMLSchema-instance" xmlns:dc="http://purl.org/dc/elements/1.1/" xmlns:dcterms="http://purl.org/dc/terms/" xmlns:odoc="http://schemas.microsoft.com/internal/obd" targetNamespace="http://schemas.openxmlformats.org/package/2006/metadata/core-properties" elementFormDefault="qualified" attributeFormDefault="unqualified" blockDefault="#all">
+    <xsd:import namespace="http://purl.org/dc/elements/1.1/" schemaLocation="http://dublincore.org/schemas/xmls/qdc/2003/04/02/dc.xsd"/>
+    <xsd:import namespace="http://purl.org/dc/terms/" schemaLocation="http://dublincore.org/schemas/xmls/qdc/2003/04/02/dcterms.xsd"/>
+    <xsd:element name="coreProperties" type="CT_coreProperties"/>
+    <xsd:complexType name="CT_coreProperties">
+      <xsd:all>
+        <xsd:element ref="dc:creator" minOccurs="0" maxOccurs="1"/>
+        <xsd:element ref="dcterms:created" minOccurs="0" maxOccurs="1"/>
+        <xsd:element ref="dc:identifier" minOccurs="0" maxOccurs="1"/>
+        <xsd:element name="contentType" minOccurs="0" maxOccurs="1" type="xsd:string" ma:index="0" ma:displayName="Content Type"/>
+        <xsd:element ref="dc:title" minOccurs="0" maxOccurs="1" ma:index="4" ma:displayName="Title"/>
+        <xsd:element ref="dc:subject" minOccurs="0" maxOccurs="1"/>
+        <xsd:element ref="dc:description" minOccurs="0" maxOccurs="1"/>
+        <xsd:element name="keywords" minOccurs="0" maxOccurs="1" type="xsd:string"/>
+        <xsd:element ref="dc:language" minOccurs="0" maxOccurs="1"/>
+        <xsd:element name="category" minOccurs="0" maxOccurs="1" type="xsd:string"/>
+        <xsd:element name="version" minOccurs="0" maxOccurs="1" type="xsd:string"/>
+        <xsd:element name="revision" minOccurs="0" maxOccurs="1" type="xsd:string">
+          <xsd:annotation>
+            <xsd:documentation>
+                        This value indicates the number of saves or revisions. The application is responsible for updating this value after each revision.
+                    </xsd:documentation>
+          </xsd:annotation>
+        </xsd:element>
+        <xsd:element name="lastModifiedBy" minOccurs="0" maxOccurs="1" type="xsd:string"/>
+        <xsd:element ref="dcterms:modified" minOccurs="0" maxOccurs="1"/>
+        <xsd:element name="contentStatus" minOccurs="0" maxOccurs="1" type="xsd:string"/>
+      </xsd:all>
+    </xsd:complexType>
+  </xsd:schema>
+  <xs:schema xmlns:pc="http://schemas.microsoft.com/office/infopath/2007/PartnerControls" xmlns:xs="http://www.w3.org/2001/XMLSchema" targetNamespace="http://schemas.microsoft.com/office/infopath/2007/PartnerControls" elementFormDefault="qualified" attributeFormDefault="unqualified">
+    <xs:element name="Person">
+      <xs:complexType>
+        <xs:sequence>
+          <xs:element ref="pc:DisplayName" minOccurs="0"/>
+          <xs:element ref="pc:AccountId" minOccurs="0"/>
+          <xs:element ref="pc:AccountType" minOccurs="0"/>
+        </xs:sequence>
+      </xs:complexType>
+    </xs:element>
+    <xs:element name="DisplayName" type="xs:string"/>
+    <xs:element name="AccountId" type="xs:string"/>
+    <xs:element name="AccountType" type="xs:string"/>
+    <xs:element name="BDCAssociatedEntity">
+      <xs:complexType>
+        <xs:sequence>
+          <xs:element ref="pc:BDCEntity" minOccurs="0" maxOccurs="unbounded"/>
+        </xs:sequence>
+        <xs:attribute ref="pc:EntityNamespace"/>
+        <xs:attribute ref="pc:EntityName"/>
+        <xs:attribute ref="pc:SystemInstanceName"/>
+        <xs:attribute ref="pc:AssociationName"/>
+      </xs:complexType>
+    </xs:element>
+    <xs:attribute name="EntityNamespace" type="xs:string"/>
+    <xs:attribute name="EntityName" type="xs:string"/>
+    <xs:attribute name="SystemInstanceName" type="xs:string"/>
+    <xs:attribute name="AssociationName" type="xs:string"/>
+    <xs:element name="BDCEntity">
+      <xs:complexType>
+        <xs:sequence>
+          <xs:element ref="pc:EntityDisplayName" minOccurs="0"/>
+          <xs:element ref="pc:EntityInstanceReference" minOccurs="0"/>
+          <xs:element ref="pc:EntityId1" minOccurs="0"/>
+          <xs:element ref="pc:EntityId2" minOccurs="0"/>
+          <xs:element ref="pc:EntityId3" minOccurs="0"/>
+          <xs:element ref="pc:EntityId4" minOccurs="0"/>
+          <xs:element ref="pc:EntityId5" minOccurs="0"/>
+        </xs:sequence>
+      </xs:complexType>
+    </xs:element>
+    <xs:element name="EntityDisplayName" type="xs:string"/>
+    <xs:element name="EntityInstanceReference" type="xs:string"/>
+    <xs:element name="EntityId1" type="xs:string"/>
+    <xs:element name="EntityId2" type="xs:string"/>
+    <xs:element name="EntityId3" type="xs:string"/>
+    <xs:element name="EntityId4" type="xs:string"/>
+    <xs:element name="EntityId5" type="xs:string"/>
+    <xs:element name="Terms">
+      <xs:complexType>
+        <xs:sequence>
+          <xs:element ref="pc:TermInfo" minOccurs="0" maxOccurs="unbounded"/>
+        </xs:sequence>
+      </xs:complexType>
+    </xs:element>
+    <xs:element name="TermInfo">
+      <xs:complexType>
+        <xs:sequence>
+          <xs:element ref="pc:TermName" minOccurs="0"/>
+          <xs:element ref="pc:TermId" minOccurs="0"/>
+        </xs:sequence>
+      </xs:complexType>
+    </xs:element>
+    <xs:element name="TermName" type="xs:string"/>
+    <xs:element name="TermId" type="xs:string"/>
+  </xs:schema>
+</ct:contentTypeSchema>
+</file>
+
+<file path=customXml/item2.xml><?xml version="1.0" encoding="utf-8"?>
+<?mso-contentType ?>
+<FormTemplates xmlns="http://schemas.microsoft.com/sharepoint/v3/contenttype/forms">
+  <Display>DocumentLibraryForm</Display>
+  <Edit>DocumentLibraryForm</Edit>
+  <New>DocumentLibraryForm</New>
+</FormTemplates>
+</file>
+
+<file path=customXml/itemProps1.xml><?xml version="1.0" encoding="utf-8"?>
+<ds:datastoreItem xmlns:ds="http://schemas.openxmlformats.org/officeDocument/2006/customXml" ds:itemID="{51F4AAEF-F514-45BB-B653-29FF3A30A9A8}"/>
+</file>
+
+<file path=customXml/itemProps2.xml><?xml version="1.0" encoding="utf-8"?>
+<ds:datastoreItem xmlns:ds="http://schemas.openxmlformats.org/officeDocument/2006/customXml" ds:itemID="{27961C49-1602-4DC3-896E-1CFE4BED8CEB}"/>
 </file>
</xml_diff>

<commit_message>
demo fixes from VS Live
</commit_message>
<xml_diff>
--- a/ArchitectZeroDowntime.pptx
+++ b/ArchitectZeroDowntime.pptx
@@ -9,10 +9,10 @@
     <p:sldMasterId id="2147483760" r:id="rId5"/>
   </p:sldMasterIdLst>
   <p:notesMasterIdLst>
-    <p:notesMasterId r:id="rId46"/>
+    <p:notesMasterId r:id="rId48"/>
   </p:notesMasterIdLst>
   <p:handoutMasterIdLst>
-    <p:handoutMasterId r:id="rId47"/>
+    <p:handoutMasterId r:id="rId49"/>
   </p:handoutMasterIdLst>
   <p:sldIdLst>
     <p:sldId id="256" r:id="rId6"/>
@@ -26,35 +26,37 @@
     <p:sldId id="376" r:id="rId14"/>
     <p:sldId id="375" r:id="rId15"/>
     <p:sldId id="374" r:id="rId16"/>
-    <p:sldId id="358" r:id="rId17"/>
-    <p:sldId id="359" r:id="rId18"/>
-    <p:sldId id="371" r:id="rId19"/>
-    <p:sldId id="360" r:id="rId20"/>
-    <p:sldId id="372" r:id="rId21"/>
-    <p:sldId id="378" r:id="rId22"/>
-    <p:sldId id="379" r:id="rId23"/>
-    <p:sldId id="356" r:id="rId24"/>
-    <p:sldId id="357" r:id="rId25"/>
-    <p:sldId id="353" r:id="rId26"/>
-    <p:sldId id="377" r:id="rId27"/>
-    <p:sldId id="361" r:id="rId28"/>
-    <p:sldId id="362" r:id="rId29"/>
-    <p:sldId id="383" r:id="rId30"/>
-    <p:sldId id="363" r:id="rId31"/>
-    <p:sldId id="380" r:id="rId32"/>
-    <p:sldId id="364" r:id="rId33"/>
-    <p:sldId id="365" r:id="rId34"/>
-    <p:sldId id="384" r:id="rId35"/>
-    <p:sldId id="366" r:id="rId36"/>
-    <p:sldId id="381" r:id="rId37"/>
-    <p:sldId id="367" r:id="rId38"/>
-    <p:sldId id="368" r:id="rId39"/>
-    <p:sldId id="369" r:id="rId40"/>
-    <p:sldId id="370" r:id="rId41"/>
-    <p:sldId id="304" r:id="rId42"/>
-    <p:sldId id="385" r:id="rId43"/>
-    <p:sldId id="259" r:id="rId44"/>
-    <p:sldId id="382" r:id="rId45"/>
+    <p:sldId id="386" r:id="rId17"/>
+    <p:sldId id="387" r:id="rId18"/>
+    <p:sldId id="358" r:id="rId19"/>
+    <p:sldId id="359" r:id="rId20"/>
+    <p:sldId id="371" r:id="rId21"/>
+    <p:sldId id="360" r:id="rId22"/>
+    <p:sldId id="372" r:id="rId23"/>
+    <p:sldId id="378" r:id="rId24"/>
+    <p:sldId id="379" r:id="rId25"/>
+    <p:sldId id="356" r:id="rId26"/>
+    <p:sldId id="357" r:id="rId27"/>
+    <p:sldId id="353" r:id="rId28"/>
+    <p:sldId id="377" r:id="rId29"/>
+    <p:sldId id="361" r:id="rId30"/>
+    <p:sldId id="362" r:id="rId31"/>
+    <p:sldId id="383" r:id="rId32"/>
+    <p:sldId id="363" r:id="rId33"/>
+    <p:sldId id="380" r:id="rId34"/>
+    <p:sldId id="364" r:id="rId35"/>
+    <p:sldId id="365" r:id="rId36"/>
+    <p:sldId id="384" r:id="rId37"/>
+    <p:sldId id="366" r:id="rId38"/>
+    <p:sldId id="381" r:id="rId39"/>
+    <p:sldId id="367" r:id="rId40"/>
+    <p:sldId id="368" r:id="rId41"/>
+    <p:sldId id="369" r:id="rId42"/>
+    <p:sldId id="370" r:id="rId43"/>
+    <p:sldId id="304" r:id="rId44"/>
+    <p:sldId id="385" r:id="rId45"/>
+    <p:sldId id="259" r:id="rId46"/>
+    <p:sldId id="382" r:id="rId47"/>
   </p:sldIdLst>
   <p:sldSz cx="9144000" cy="5143500" type="screen16x9"/>
   <p:notesSz cx="6858000" cy="9144000"/>
@@ -1000,7 +1002,7 @@
           <a:p>
             <a:fld id="{D088F999-7A4E-6B4F-9FED-EF75B73AD044}" type="datetimeFigureOut">
               <a:rPr lang="en-US" smtClean="0"/>
-              <a:t>5/3/2023</a:t>
+              <a:t>6/6/2023</a:t>
             </a:fld>
             <a:endParaRPr lang="en-US"/>
           </a:p>
@@ -1168,7 +1170,7 @@
           <a:p>
             <a:fld id="{D088F999-7A4E-6B4F-9FED-EF75B73AD044}" type="datetimeFigureOut">
               <a:rPr lang="en-US" smtClean="0"/>
-              <a:t>5/3/2023</a:t>
+              <a:t>6/6/2023</a:t>
             </a:fld>
             <a:endParaRPr lang="en-US"/>
           </a:p>
@@ -1346,7 +1348,7 @@
           <a:p>
             <a:fld id="{D088F999-7A4E-6B4F-9FED-EF75B73AD044}" type="datetimeFigureOut">
               <a:rPr lang="en-US" smtClean="0"/>
-              <a:t>5/3/2023</a:t>
+              <a:t>6/6/2023</a:t>
             </a:fld>
             <a:endParaRPr lang="en-US"/>
           </a:p>
@@ -1586,7 +1588,7 @@
             <a:fld id="{3FE51E94-D08C-431E-88FC-7EB62E529A19}" type="datetimeFigureOut">
               <a:rPr lang="en-US" smtClean="0"/>
               <a:pPr/>
-              <a:t>5/3/2023</a:t>
+              <a:t>6/6/2023</a:t>
             </a:fld>
             <a:endParaRPr lang="en-US"/>
           </a:p>
@@ -1756,7 +1758,7 @@
             <a:fld id="{3FE51E94-D08C-431E-88FC-7EB62E529A19}" type="datetimeFigureOut">
               <a:rPr lang="en-US" smtClean="0"/>
               <a:pPr/>
-              <a:t>5/3/2023</a:t>
+              <a:t>6/6/2023</a:t>
             </a:fld>
             <a:endParaRPr lang="en-US"/>
           </a:p>
@@ -2003,7 +2005,7 @@
             <a:fld id="{3FE51E94-D08C-431E-88FC-7EB62E529A19}" type="datetimeFigureOut">
               <a:rPr lang="en-US" smtClean="0"/>
               <a:pPr/>
-              <a:t>5/3/2023</a:t>
+              <a:t>6/6/2023</a:t>
             </a:fld>
             <a:endParaRPr lang="en-US"/>
           </a:p>
@@ -2290,7 +2292,7 @@
             <a:fld id="{3FE51E94-D08C-431E-88FC-7EB62E529A19}" type="datetimeFigureOut">
               <a:rPr lang="en-US" smtClean="0"/>
               <a:pPr/>
-              <a:t>5/3/2023</a:t>
+              <a:t>6/6/2023</a:t>
             </a:fld>
             <a:endParaRPr lang="en-US"/>
           </a:p>
@@ -2716,7 +2718,7 @@
             <a:fld id="{3FE51E94-D08C-431E-88FC-7EB62E529A19}" type="datetimeFigureOut">
               <a:rPr lang="en-US" smtClean="0"/>
               <a:pPr/>
-              <a:t>5/3/2023</a:t>
+              <a:t>6/6/2023</a:t>
             </a:fld>
             <a:endParaRPr lang="en-US"/>
           </a:p>
@@ -2835,7 +2837,7 @@
             <a:fld id="{3FE51E94-D08C-431E-88FC-7EB62E529A19}" type="datetimeFigureOut">
               <a:rPr lang="en-US" smtClean="0"/>
               <a:pPr/>
-              <a:t>5/3/2023</a:t>
+              <a:t>6/6/2023</a:t>
             </a:fld>
             <a:endParaRPr lang="en-US"/>
           </a:p>
@@ -2932,7 +2934,7 @@
             <a:fld id="{3FE51E94-D08C-431E-88FC-7EB62E529A19}" type="datetimeFigureOut">
               <a:rPr lang="en-US" smtClean="0"/>
               <a:pPr/>
-              <a:t>5/3/2023</a:t>
+              <a:t>6/6/2023</a:t>
             </a:fld>
             <a:endParaRPr lang="en-US"/>
           </a:p>
@@ -3209,7 +3211,7 @@
             <a:fld id="{3FE51E94-D08C-431E-88FC-7EB62E529A19}" type="datetimeFigureOut">
               <a:rPr lang="en-US" smtClean="0"/>
               <a:pPr/>
-              <a:t>5/3/2023</a:t>
+              <a:t>6/6/2023</a:t>
             </a:fld>
             <a:endParaRPr lang="en-US"/>
           </a:p>
@@ -3378,7 +3380,7 @@
           <a:p>
             <a:fld id="{D088F999-7A4E-6B4F-9FED-EF75B73AD044}" type="datetimeFigureOut">
               <a:rPr lang="en-US" smtClean="0"/>
-              <a:t>5/3/2023</a:t>
+              <a:t>6/6/2023</a:t>
             </a:fld>
             <a:endParaRPr lang="en-US"/>
           </a:p>
@@ -3634,7 +3636,7 @@
             <a:fld id="{3FE51E94-D08C-431E-88FC-7EB62E529A19}" type="datetimeFigureOut">
               <a:rPr lang="en-US" smtClean="0"/>
               <a:pPr/>
-              <a:t>5/3/2023</a:t>
+              <a:t>6/6/2023</a:t>
             </a:fld>
             <a:endParaRPr lang="en-US"/>
           </a:p>
@@ -3804,7 +3806,7 @@
             <a:fld id="{3FE51E94-D08C-431E-88FC-7EB62E529A19}" type="datetimeFigureOut">
               <a:rPr lang="en-US" smtClean="0"/>
               <a:pPr/>
-              <a:t>5/3/2023</a:t>
+              <a:t>6/6/2023</a:t>
             </a:fld>
             <a:endParaRPr lang="en-US"/>
           </a:p>
@@ -3984,7 +3986,7 @@
             <a:fld id="{3FE51E94-D08C-431E-88FC-7EB62E529A19}" type="datetimeFigureOut">
               <a:rPr lang="en-US" smtClean="0"/>
               <a:pPr/>
-              <a:t>5/3/2023</a:t>
+              <a:t>6/6/2023</a:t>
             </a:fld>
             <a:endParaRPr lang="en-US"/>
           </a:p>
@@ -4281,7 +4283,7 @@
           <a:p>
             <a:fld id="{D088F999-7A4E-6B4F-9FED-EF75B73AD044}" type="datetimeFigureOut">
               <a:rPr lang="en-US" smtClean="0"/>
-              <a:t>5/3/2023</a:t>
+              <a:t>6/6/2023</a:t>
             </a:fld>
             <a:endParaRPr lang="en-US"/>
           </a:p>
@@ -4449,7 +4451,7 @@
           <a:p>
             <a:fld id="{D088F999-7A4E-6B4F-9FED-EF75B73AD044}" type="datetimeFigureOut">
               <a:rPr lang="en-US" smtClean="0"/>
-              <a:t>5/3/2023</a:t>
+              <a:t>6/6/2023</a:t>
             </a:fld>
             <a:endParaRPr lang="en-US"/>
           </a:p>
@@ -4941,7 +4943,7 @@
           <a:p>
             <a:fld id="{D088F999-7A4E-6B4F-9FED-EF75B73AD044}" type="datetimeFigureOut">
               <a:rPr lang="en-US" smtClean="0"/>
-              <a:t>5/3/2023</a:t>
+              <a:t>6/6/2023</a:t>
             </a:fld>
             <a:endParaRPr lang="en-US"/>
           </a:p>
@@ -5360,7 +5362,7 @@
           <a:p>
             <a:fld id="{D088F999-7A4E-6B4F-9FED-EF75B73AD044}" type="datetimeFigureOut">
               <a:rPr lang="en-US" smtClean="0"/>
-              <a:t>5/3/2023</a:t>
+              <a:t>6/6/2023</a:t>
             </a:fld>
             <a:endParaRPr lang="en-US"/>
           </a:p>
@@ -5477,7 +5479,7 @@
           <a:p>
             <a:fld id="{D088F999-7A4E-6B4F-9FED-EF75B73AD044}" type="datetimeFigureOut">
               <a:rPr lang="en-US" smtClean="0"/>
-              <a:t>5/3/2023</a:t>
+              <a:t>6/6/2023</a:t>
             </a:fld>
             <a:endParaRPr lang="en-US"/>
           </a:p>
@@ -5722,7 +5724,7 @@
           <a:p>
             <a:fld id="{D088F999-7A4E-6B4F-9FED-EF75B73AD044}" type="datetimeFigureOut">
               <a:rPr lang="en-US" smtClean="0"/>
-              <a:t>5/3/2023</a:t>
+              <a:t>6/6/2023</a:t>
             </a:fld>
             <a:endParaRPr lang="en-US"/>
           </a:p>
@@ -5817,7 +5819,7 @@
           <a:p>
             <a:fld id="{D088F999-7A4E-6B4F-9FED-EF75B73AD044}" type="datetimeFigureOut">
               <a:rPr lang="en-US" smtClean="0"/>
-              <a:t>5/3/2023</a:t>
+              <a:t>6/6/2023</a:t>
             </a:fld>
             <a:endParaRPr lang="en-US"/>
           </a:p>
@@ -6092,7 +6094,7 @@
           <a:p>
             <a:fld id="{D088F999-7A4E-6B4F-9FED-EF75B73AD044}" type="datetimeFigureOut">
               <a:rPr lang="en-US" smtClean="0"/>
-              <a:t>5/3/2023</a:t>
+              <a:t>6/6/2023</a:t>
             </a:fld>
             <a:endParaRPr lang="en-US"/>
           </a:p>
@@ -6347,7 +6349,7 @@
           <a:p>
             <a:fld id="{D088F999-7A4E-6B4F-9FED-EF75B73AD044}" type="datetimeFigureOut">
               <a:rPr lang="en-US" smtClean="0"/>
-              <a:t>5/3/2023</a:t>
+              <a:t>6/6/2023</a:t>
             </a:fld>
             <a:endParaRPr lang="en-US"/>
           </a:p>
@@ -6515,7 +6517,7 @@
           <a:p>
             <a:fld id="{D088F999-7A4E-6B4F-9FED-EF75B73AD044}" type="datetimeFigureOut">
               <a:rPr lang="en-US" smtClean="0"/>
-              <a:t>5/3/2023</a:t>
+              <a:t>6/6/2023</a:t>
             </a:fld>
             <a:endParaRPr lang="en-US"/>
           </a:p>
@@ -6693,7 +6695,7 @@
           <a:p>
             <a:fld id="{D088F999-7A4E-6B4F-9FED-EF75B73AD044}" type="datetimeFigureOut">
               <a:rPr lang="en-US" smtClean="0"/>
-              <a:t>5/3/2023</a:t>
+              <a:t>6/6/2023</a:t>
             </a:fld>
             <a:endParaRPr lang="en-US"/>
           </a:p>
@@ -6934,7 +6936,7 @@
             <a:fld id="{3FE51E94-D08C-431E-88FC-7EB62E529A19}" type="datetimeFigureOut">
               <a:rPr lang="en-US" smtClean="0"/>
               <a:pPr/>
-              <a:t>5/3/2023</a:t>
+              <a:t>6/6/2023</a:t>
             </a:fld>
             <a:endParaRPr lang="en-US"/>
           </a:p>
@@ -7104,7 +7106,7 @@
             <a:fld id="{3FE51E94-D08C-431E-88FC-7EB62E529A19}" type="datetimeFigureOut">
               <a:rPr lang="en-US" smtClean="0"/>
               <a:pPr/>
-              <a:t>5/3/2023</a:t>
+              <a:t>6/6/2023</a:t>
             </a:fld>
             <a:endParaRPr lang="en-US"/>
           </a:p>
@@ -7351,7 +7353,7 @@
             <a:fld id="{3FE51E94-D08C-431E-88FC-7EB62E529A19}" type="datetimeFigureOut">
               <a:rPr lang="en-US" smtClean="0"/>
               <a:pPr/>
-              <a:t>5/3/2023</a:t>
+              <a:t>6/6/2023</a:t>
             </a:fld>
             <a:endParaRPr lang="en-US"/>
           </a:p>
@@ -7638,7 +7640,7 @@
             <a:fld id="{3FE51E94-D08C-431E-88FC-7EB62E529A19}" type="datetimeFigureOut">
               <a:rPr lang="en-US" smtClean="0"/>
               <a:pPr/>
-              <a:t>5/3/2023</a:t>
+              <a:t>6/6/2023</a:t>
             </a:fld>
             <a:endParaRPr lang="en-US"/>
           </a:p>
@@ -8059,7 +8061,7 @@
             <a:fld id="{3FE51E94-D08C-431E-88FC-7EB62E529A19}" type="datetimeFigureOut">
               <a:rPr lang="en-US" smtClean="0"/>
               <a:pPr/>
-              <a:t>5/3/2023</a:t>
+              <a:t>6/6/2023</a:t>
             </a:fld>
             <a:endParaRPr lang="en-US"/>
           </a:p>
@@ -8345,7 +8347,7 @@
           <a:p>
             <a:fld id="{D088F999-7A4E-6B4F-9FED-EF75B73AD044}" type="datetimeFigureOut">
               <a:rPr lang="en-US" smtClean="0"/>
-              <a:t>5/3/2023</a:t>
+              <a:t>6/6/2023</a:t>
             </a:fld>
             <a:endParaRPr lang="en-US"/>
           </a:p>
@@ -8463,7 +8465,7 @@
             <a:fld id="{3FE51E94-D08C-431E-88FC-7EB62E529A19}" type="datetimeFigureOut">
               <a:rPr lang="en-US" smtClean="0"/>
               <a:pPr/>
-              <a:t>5/3/2023</a:t>
+              <a:t>6/6/2023</a:t>
             </a:fld>
             <a:endParaRPr lang="en-US"/>
           </a:p>
@@ -8560,7 +8562,7 @@
             <a:fld id="{3FE51E94-D08C-431E-88FC-7EB62E529A19}" type="datetimeFigureOut">
               <a:rPr lang="en-US" smtClean="0"/>
               <a:pPr/>
-              <a:t>5/3/2023</a:t>
+              <a:t>6/6/2023</a:t>
             </a:fld>
             <a:endParaRPr lang="en-US"/>
           </a:p>
@@ -8837,7 +8839,7 @@
             <a:fld id="{3FE51E94-D08C-431E-88FC-7EB62E529A19}" type="datetimeFigureOut">
               <a:rPr lang="en-US" smtClean="0"/>
               <a:pPr/>
-              <a:t>5/3/2023</a:t>
+              <a:t>6/6/2023</a:t>
             </a:fld>
             <a:endParaRPr lang="en-US"/>
           </a:p>
@@ -9094,7 +9096,7 @@
             <a:fld id="{3FE51E94-D08C-431E-88FC-7EB62E529A19}" type="datetimeFigureOut">
               <a:rPr lang="en-US" smtClean="0"/>
               <a:pPr/>
-              <a:t>5/3/2023</a:t>
+              <a:t>6/6/2023</a:t>
             </a:fld>
             <a:endParaRPr lang="en-US"/>
           </a:p>
@@ -9264,7 +9266,7 @@
             <a:fld id="{3FE51E94-D08C-431E-88FC-7EB62E529A19}" type="datetimeFigureOut">
               <a:rPr lang="en-US" smtClean="0"/>
               <a:pPr/>
-              <a:t>5/3/2023</a:t>
+              <a:t>6/6/2023</a:t>
             </a:fld>
             <a:endParaRPr lang="en-US"/>
           </a:p>
@@ -9444,7 +9446,7 @@
             <a:fld id="{3FE51E94-D08C-431E-88FC-7EB62E529A19}" type="datetimeFigureOut">
               <a:rPr lang="en-US" smtClean="0"/>
               <a:pPr/>
-              <a:t>5/3/2023</a:t>
+              <a:t>6/6/2023</a:t>
             </a:fld>
             <a:endParaRPr lang="en-US"/>
           </a:p>
@@ -9700,7 +9702,7 @@
             <a:fld id="{3FE51E94-D08C-431E-88FC-7EB62E529A19}" type="datetimeFigureOut">
               <a:rPr lang="en-US" smtClean="0"/>
               <a:pPr/>
-              <a:t>5/3/2023</a:t>
+              <a:t>6/6/2023</a:t>
             </a:fld>
             <a:endParaRPr lang="en-US"/>
           </a:p>
@@ -9870,7 +9872,7 @@
             <a:fld id="{3FE51E94-D08C-431E-88FC-7EB62E529A19}" type="datetimeFigureOut">
               <a:rPr lang="en-US" smtClean="0"/>
               <a:pPr/>
-              <a:t>5/3/2023</a:t>
+              <a:t>6/6/2023</a:t>
             </a:fld>
             <a:endParaRPr lang="en-US"/>
           </a:p>
@@ -10117,7 +10119,7 @@
             <a:fld id="{3FE51E94-D08C-431E-88FC-7EB62E529A19}" type="datetimeFigureOut">
               <a:rPr lang="en-US" smtClean="0"/>
               <a:pPr/>
-              <a:t>5/3/2023</a:t>
+              <a:t>6/6/2023</a:t>
             </a:fld>
             <a:endParaRPr lang="en-US"/>
           </a:p>
@@ -10404,7 +10406,7 @@
             <a:fld id="{3FE51E94-D08C-431E-88FC-7EB62E529A19}" type="datetimeFigureOut">
               <a:rPr lang="en-US" smtClean="0"/>
               <a:pPr/>
-              <a:t>5/3/2023</a:t>
+              <a:t>6/6/2023</a:t>
             </a:fld>
             <a:endParaRPr lang="en-US"/>
           </a:p>
@@ -10824,7 +10826,7 @@
           <a:p>
             <a:fld id="{D088F999-7A4E-6B4F-9FED-EF75B73AD044}" type="datetimeFigureOut">
               <a:rPr lang="en-US" smtClean="0"/>
-              <a:t>5/3/2023</a:t>
+              <a:t>6/6/2023</a:t>
             </a:fld>
             <a:endParaRPr lang="en-US"/>
           </a:p>
@@ -11244,7 +11246,7 @@
             <a:fld id="{3FE51E94-D08C-431E-88FC-7EB62E529A19}" type="datetimeFigureOut">
               <a:rPr lang="en-US" smtClean="0"/>
               <a:pPr/>
-              <a:t>5/3/2023</a:t>
+              <a:t>6/6/2023</a:t>
             </a:fld>
             <a:endParaRPr lang="en-US"/>
           </a:p>
@@ -11363,7 +11365,7 @@
             <a:fld id="{3FE51E94-D08C-431E-88FC-7EB62E529A19}" type="datetimeFigureOut">
               <a:rPr lang="en-US" smtClean="0"/>
               <a:pPr/>
-              <a:t>5/3/2023</a:t>
+              <a:t>6/6/2023</a:t>
             </a:fld>
             <a:endParaRPr lang="en-US"/>
           </a:p>
@@ -11460,7 +11462,7 @@
             <a:fld id="{3FE51E94-D08C-431E-88FC-7EB62E529A19}" type="datetimeFigureOut">
               <a:rPr lang="en-US" smtClean="0"/>
               <a:pPr/>
-              <a:t>5/3/2023</a:t>
+              <a:t>6/6/2023</a:t>
             </a:fld>
             <a:endParaRPr lang="en-US"/>
           </a:p>
@@ -11737,7 +11739,7 @@
             <a:fld id="{3FE51E94-D08C-431E-88FC-7EB62E529A19}" type="datetimeFigureOut">
               <a:rPr lang="en-US" smtClean="0"/>
               <a:pPr/>
-              <a:t>5/3/2023</a:t>
+              <a:t>6/6/2023</a:t>
             </a:fld>
             <a:endParaRPr lang="en-US"/>
           </a:p>
@@ -11994,7 +11996,7 @@
             <a:fld id="{3FE51E94-D08C-431E-88FC-7EB62E529A19}" type="datetimeFigureOut">
               <a:rPr lang="en-US" smtClean="0"/>
               <a:pPr/>
-              <a:t>5/3/2023</a:t>
+              <a:t>6/6/2023</a:t>
             </a:fld>
             <a:endParaRPr lang="en-US"/>
           </a:p>
@@ -12164,7 +12166,7 @@
             <a:fld id="{3FE51E94-D08C-431E-88FC-7EB62E529A19}" type="datetimeFigureOut">
               <a:rPr lang="en-US" smtClean="0"/>
               <a:pPr/>
-              <a:t>5/3/2023</a:t>
+              <a:t>6/6/2023</a:t>
             </a:fld>
             <a:endParaRPr lang="en-US"/>
           </a:p>
@@ -12344,7 +12346,7 @@
             <a:fld id="{3FE51E94-D08C-431E-88FC-7EB62E529A19}" type="datetimeFigureOut">
               <a:rPr lang="en-US" smtClean="0"/>
               <a:pPr/>
-              <a:t>5/3/2023</a:t>
+              <a:t>6/6/2023</a:t>
             </a:fld>
             <a:endParaRPr lang="en-US"/>
           </a:p>
@@ -12462,7 +12464,7 @@
           <a:p>
             <a:fld id="{D088F999-7A4E-6B4F-9FED-EF75B73AD044}" type="datetimeFigureOut">
               <a:rPr lang="en-US" smtClean="0"/>
-              <a:t>5/3/2023</a:t>
+              <a:t>6/6/2023</a:t>
             </a:fld>
             <a:endParaRPr lang="en-US"/>
           </a:p>
@@ -12557,7 +12559,7 @@
           <a:p>
             <a:fld id="{D088F999-7A4E-6B4F-9FED-EF75B73AD044}" type="datetimeFigureOut">
               <a:rPr lang="en-US" smtClean="0"/>
-              <a:t>5/3/2023</a:t>
+              <a:t>6/6/2023</a:t>
             </a:fld>
             <a:endParaRPr lang="en-US"/>
           </a:p>
@@ -12832,7 +12834,7 @@
           <a:p>
             <a:fld id="{D088F999-7A4E-6B4F-9FED-EF75B73AD044}" type="datetimeFigureOut">
               <a:rPr lang="en-US" smtClean="0"/>
-              <a:t>5/3/2023</a:t>
+              <a:t>6/6/2023</a:t>
             </a:fld>
             <a:endParaRPr lang="en-US"/>
           </a:p>
@@ -13084,7 +13086,7 @@
           <a:p>
             <a:fld id="{D088F999-7A4E-6B4F-9FED-EF75B73AD044}" type="datetimeFigureOut">
               <a:rPr lang="en-US" smtClean="0"/>
-              <a:t>5/3/2023</a:t>
+              <a:t>6/6/2023</a:t>
             </a:fld>
             <a:endParaRPr lang="en-US"/>
           </a:p>
@@ -13304,7 +13306,7 @@
           <a:p>
             <a:fld id="{D088F999-7A4E-6B4F-9FED-EF75B73AD044}" type="datetimeFigureOut">
               <a:rPr lang="en-US" smtClean="0"/>
-              <a:t>5/3/2023</a:t>
+              <a:t>6/6/2023</a:t>
             </a:fld>
             <a:endParaRPr lang="en-US"/>
           </a:p>
@@ -13824,7 +13826,7 @@
             <a:fld id="{3FE51E94-D08C-431E-88FC-7EB62E529A19}" type="datetimeFigureOut">
               <a:rPr lang="en-US" smtClean="0"/>
               <a:pPr/>
-              <a:t>5/3/2023</a:t>
+              <a:t>6/6/2023</a:t>
             </a:fld>
             <a:endParaRPr lang="en-US"/>
           </a:p>
@@ -14343,7 +14345,7 @@
           <a:p>
             <a:fld id="{D088F999-7A4E-6B4F-9FED-EF75B73AD044}" type="datetimeFigureOut">
               <a:rPr lang="en-US" smtClean="0"/>
-              <a:t>5/3/2023</a:t>
+              <a:t>6/6/2023</a:t>
             </a:fld>
             <a:endParaRPr lang="en-US"/>
           </a:p>
@@ -14860,7 +14862,7 @@
           <a:p>
             <a:fld id="{D088F999-7A4E-6B4F-9FED-EF75B73AD044}" type="datetimeFigureOut">
               <a:rPr lang="en-US" smtClean="0"/>
-              <a:t>5/3/2023</a:t>
+              <a:t>6/6/2023</a:t>
             </a:fld>
             <a:endParaRPr lang="en-US"/>
           </a:p>
@@ -15377,7 +15379,7 @@
           <a:p>
             <a:fld id="{D088F999-7A4E-6B4F-9FED-EF75B73AD044}" type="datetimeFigureOut">
               <a:rPr lang="en-US" smtClean="0"/>
-              <a:t>5/3/2023</a:t>
+              <a:t>6/6/2023</a:t>
             </a:fld>
             <a:endParaRPr lang="en-US"/>
           </a:p>
@@ -16302,7 +16304,7 @@
           <a:p>
             <a:r>
               <a:rPr lang="en-US" dirty="0"/>
-              <a:t>Splitting a column</a:t>
+              <a:t>Getting started</a:t>
             </a:r>
           </a:p>
         </p:txBody>
@@ -16324,7 +16326,7 @@
           <a:p>
             <a:r>
               <a:rPr lang="en-US" dirty="0"/>
-              <a:t>Working towards normalization</a:t>
+              <a:t>Let’s start a workload</a:t>
             </a:r>
           </a:p>
         </p:txBody>
@@ -16332,7 +16334,7 @@
     </p:spTree>
     <p:extLst>
       <p:ext uri="{BB962C8B-B14F-4D97-AF65-F5344CB8AC3E}">
-        <p14:creationId xmlns:p14="http://schemas.microsoft.com/office/powerpoint/2010/main" val="2516143027"/>
+        <p14:creationId xmlns:p14="http://schemas.microsoft.com/office/powerpoint/2010/main" val="1760772970"/>
       </p:ext>
     </p:extLst>
   </p:cSld>
@@ -16376,7 +16378,7 @@
           <a:p>
             <a:r>
               <a:rPr lang="en-US" dirty="0"/>
-              <a:t>The Scenario</a:t>
+              <a:t>Simulating Users</a:t>
             </a:r>
           </a:p>
         </p:txBody>
@@ -16394,65 +16396,44 @@
         <p:spPr/>
         <p:txBody>
           <a:bodyPr>
-            <a:normAutofit fontScale="85000" lnSpcReduction="20000"/>
+            <a:normAutofit/>
           </a:bodyPr>
           <a:lstStyle/>
           <a:p>
             <a:r>
               <a:rPr lang="en-US" dirty="0"/>
-              <a:t>We have a </a:t>
+              <a:t>GitHub: way0utwest/</a:t>
             </a:r>
             <a:r>
               <a:rPr lang="en-US" dirty="0" err="1"/>
-              <a:t>CustomerName</a:t>
-            </a:r>
+              <a:t>ZeroDowntime</a:t>
+            </a:r>
+            <a:endParaRPr lang="en-US" dirty="0"/>
+          </a:p>
+          <a:p>
             <a:r>
               <a:rPr lang="en-US" dirty="0"/>
-              <a:t> column in </a:t>
-            </a:r>
-            <a:r>
-              <a:rPr lang="en-US" dirty="0" err="1"/>
-              <a:t>dbo.Customers</a:t>
-            </a:r>
-            <a:endParaRPr lang="en-US" dirty="0"/>
+              <a:t>Run SQL scripts 1 and 2</a:t>
+            </a:r>
           </a:p>
           <a:p>
             <a:r>
               <a:rPr lang="en-US" dirty="0"/>
-              <a:t>We want this split to two columns:</a:t>
+              <a:t>Start the client app</a:t>
             </a:r>
           </a:p>
           <a:p>
             <a:pPr lvl="1"/>
             <a:r>
               <a:rPr lang="en-US" dirty="0"/>
-              <a:t>FirstName</a:t>
+              <a:t>VS 2019 </a:t>
             </a:r>
           </a:p>
           <a:p>
             <a:pPr lvl="1"/>
             <a:r>
-              <a:rPr lang="en-US" dirty="0" err="1"/>
-              <a:t>LastName</a:t>
-            </a:r>
-            <a:endParaRPr lang="en-US" dirty="0"/>
-          </a:p>
-          <a:p>
-            <a:r>
               <a:rPr lang="en-US" dirty="0"/>
-              <a:t>A common occurrence when we realize we’ve modeled incorrectly</a:t>
-            </a:r>
-          </a:p>
-          <a:p>
-            <a:r>
-              <a:rPr lang="en-US" dirty="0"/>
-              <a:t>Multiple types of information are in one column</a:t>
-            </a:r>
-          </a:p>
-          <a:p>
-            <a:r>
-              <a:rPr lang="en-US" dirty="0"/>
-              <a:t>We are becoming more normalized</a:t>
+              <a:t>Zerodowntime.sln</a:t>
             </a:r>
           </a:p>
         </p:txBody>
@@ -16460,7 +16441,7 @@
     </p:spTree>
     <p:extLst>
       <p:ext uri="{BB962C8B-B14F-4D97-AF65-F5344CB8AC3E}">
-        <p14:creationId xmlns:p14="http://schemas.microsoft.com/office/powerpoint/2010/main" val="2265791813"/>
+        <p14:creationId xmlns:p14="http://schemas.microsoft.com/office/powerpoint/2010/main" val="3423080657"/>
       </p:ext>
     </p:extLst>
   </p:cSld>
@@ -16489,7 +16470,7 @@
       </p:grpSpPr>
       <p:sp>
         <p:nvSpPr>
-          <p:cNvPr id="2" name="Title 1"/>
+          <p:cNvPr id="4" name="Title 3"/>
           <p:cNvSpPr>
             <a:spLocks noGrp="1"/>
           </p:cNvSpPr>
@@ -16504,118 +16485,29 @@
           <a:p>
             <a:r>
               <a:rPr lang="en-US" dirty="0"/>
-              <a:t>The Typical Process</a:t>
-            </a:r>
-          </a:p>
-        </p:txBody>
-      </p:sp>
-      <p:sp>
-        <p:nvSpPr>
-          <p:cNvPr id="3" name="Content Placeholder 2"/>
-          <p:cNvSpPr>
-            <a:spLocks noGrp="1"/>
-          </p:cNvSpPr>
-          <p:nvPr>
-            <p:ph idx="1"/>
-          </p:nvPr>
-        </p:nvSpPr>
-        <p:spPr/>
-        <p:txBody>
-          <a:bodyPr>
-            <a:normAutofit fontScale="85000" lnSpcReduction="20000"/>
-          </a:bodyPr>
+              <a:t>Splitting a column</a:t>
+            </a:r>
+          </a:p>
+        </p:txBody>
+      </p:sp>
+      <p:sp>
+        <p:nvSpPr>
+          <p:cNvPr id="5" name="Text Placeholder 4"/>
+          <p:cNvSpPr>
+            <a:spLocks noGrp="1"/>
+          </p:cNvSpPr>
+          <p:nvPr>
+            <p:ph type="body" idx="1"/>
+          </p:nvPr>
+        </p:nvSpPr>
+        <p:spPr/>
+        <p:txBody>
+          <a:bodyPr/>
           <a:lstStyle/>
           <a:p>
             <a:r>
               <a:rPr lang="en-US" dirty="0"/>
-              <a:t>We deploy this in one transaction:</a:t>
-            </a:r>
-          </a:p>
-          <a:p>
-            <a:pPr lvl="1"/>
-            <a:r>
-              <a:rPr lang="en-US" dirty="0"/>
-              <a:t>Add columns to the table: FirstName and </a:t>
-            </a:r>
-            <a:r>
-              <a:rPr lang="en-US" dirty="0" err="1"/>
-              <a:t>LastName</a:t>
-            </a:r>
-            <a:endParaRPr lang="en-US" dirty="0"/>
-          </a:p>
-          <a:p>
-            <a:pPr lvl="1"/>
-            <a:r>
-              <a:rPr lang="en-US" dirty="0"/>
-              <a:t>UPDATE the columns by splitting the data in </a:t>
-            </a:r>
-            <a:r>
-              <a:rPr lang="en-US" dirty="0" err="1"/>
-              <a:t>CustomerName</a:t>
-            </a:r>
-            <a:endParaRPr lang="en-US" dirty="0"/>
-          </a:p>
-          <a:p>
-            <a:pPr lvl="1"/>
-            <a:r>
-              <a:rPr lang="en-US" dirty="0"/>
-              <a:t>Drop the </a:t>
-            </a:r>
-            <a:r>
-              <a:rPr lang="en-US" dirty="0" err="1"/>
-              <a:t>CustomerName</a:t>
-            </a:r>
-            <a:r>
-              <a:rPr lang="en-US" dirty="0"/>
-              <a:t> column</a:t>
-            </a:r>
-          </a:p>
-          <a:p>
-            <a:r>
-              <a:rPr lang="en-US" dirty="0"/>
-              <a:t>Challenges</a:t>
-            </a:r>
-          </a:p>
-          <a:p>
-            <a:pPr lvl="1"/>
-            <a:r>
-              <a:rPr lang="en-US" dirty="0"/>
-              <a:t>We might have applications using </a:t>
-            </a:r>
-            <a:r>
-              <a:rPr lang="en-US" dirty="0" err="1"/>
-              <a:t>CustomerName</a:t>
-            </a:r>
-            <a:endParaRPr lang="en-US" dirty="0"/>
-          </a:p>
-          <a:p>
-            <a:pPr lvl="1"/>
-            <a:r>
-              <a:rPr lang="en-US" dirty="0"/>
-              <a:t>The UPDATE statement might block users while running</a:t>
-            </a:r>
-          </a:p>
-          <a:p>
-            <a:pPr lvl="1"/>
-            <a:r>
-              <a:rPr lang="en-US" dirty="0"/>
-              <a:t>We will not split some data properly (</a:t>
-            </a:r>
-            <a:r>
-              <a:rPr lang="en-US" b="0" i="0" dirty="0">
-                <a:effectLst/>
-              </a:rPr>
-              <a:t>George </a:t>
-            </a:r>
-            <a:r>
-              <a:rPr lang="en-US" i="0" dirty="0">
-                <a:effectLst/>
-              </a:rPr>
-              <a:t>von Trapp</a:t>
-            </a:r>
-            <a:r>
-              <a:rPr lang="en-US" dirty="0"/>
-              <a:t>)</a:t>
+              <a:t>Working towards normalization</a:t>
             </a:r>
           </a:p>
         </p:txBody>
@@ -16623,7 +16515,7 @@
     </p:spTree>
     <p:extLst>
       <p:ext uri="{BB962C8B-B14F-4D97-AF65-F5344CB8AC3E}">
-        <p14:creationId xmlns:p14="http://schemas.microsoft.com/office/powerpoint/2010/main" val="1577561528"/>
+        <p14:creationId xmlns:p14="http://schemas.microsoft.com/office/powerpoint/2010/main" val="2516143027"/>
       </p:ext>
     </p:extLst>
   </p:cSld>
@@ -16652,7 +16544,7 @@
       </p:grpSpPr>
       <p:sp>
         <p:nvSpPr>
-          <p:cNvPr id="4" name="Title 3"/>
+          <p:cNvPr id="2" name="Title 1"/>
           <p:cNvSpPr>
             <a:spLocks noGrp="1"/>
           </p:cNvSpPr>
@@ -16667,29 +16559,83 @@
           <a:p>
             <a:r>
               <a:rPr lang="en-US" dirty="0"/>
-              <a:t>Demo</a:t>
-            </a:r>
-          </a:p>
-        </p:txBody>
-      </p:sp>
-      <p:sp>
-        <p:nvSpPr>
-          <p:cNvPr id="5" name="Text Placeholder 4"/>
-          <p:cNvSpPr>
-            <a:spLocks noGrp="1"/>
-          </p:cNvSpPr>
-          <p:nvPr>
-            <p:ph type="body" idx="1"/>
-          </p:nvPr>
-        </p:nvSpPr>
-        <p:spPr/>
-        <p:txBody>
-          <a:bodyPr/>
+              <a:t>The Scenario</a:t>
+            </a:r>
+          </a:p>
+        </p:txBody>
+      </p:sp>
+      <p:sp>
+        <p:nvSpPr>
+          <p:cNvPr id="3" name="Content Placeholder 2"/>
+          <p:cNvSpPr>
+            <a:spLocks noGrp="1"/>
+          </p:cNvSpPr>
+          <p:nvPr>
+            <p:ph idx="1"/>
+          </p:nvPr>
+        </p:nvSpPr>
+        <p:spPr/>
+        <p:txBody>
+          <a:bodyPr>
+            <a:normAutofit fontScale="85000" lnSpcReduction="20000"/>
+          </a:bodyPr>
           <a:lstStyle/>
           <a:p>
             <a:r>
               <a:rPr lang="en-US" dirty="0"/>
-              <a:t>Splitting a column</a:t>
+              <a:t>We have a </a:t>
+            </a:r>
+            <a:r>
+              <a:rPr lang="en-US" dirty="0" err="1"/>
+              <a:t>CustomerName</a:t>
+            </a:r>
+            <a:r>
+              <a:rPr lang="en-US" dirty="0"/>
+              <a:t> column in </a:t>
+            </a:r>
+            <a:r>
+              <a:rPr lang="en-US" dirty="0" err="1"/>
+              <a:t>dbo.Customers</a:t>
+            </a:r>
+            <a:endParaRPr lang="en-US" dirty="0"/>
+          </a:p>
+          <a:p>
+            <a:r>
+              <a:rPr lang="en-US" dirty="0"/>
+              <a:t>We want this split to two columns:</a:t>
+            </a:r>
+          </a:p>
+          <a:p>
+            <a:pPr lvl="1"/>
+            <a:r>
+              <a:rPr lang="en-US" dirty="0"/>
+              <a:t>FirstName</a:t>
+            </a:r>
+          </a:p>
+          <a:p>
+            <a:pPr lvl="1"/>
+            <a:r>
+              <a:rPr lang="en-US" dirty="0" err="1"/>
+              <a:t>LastName</a:t>
+            </a:r>
+            <a:endParaRPr lang="en-US" dirty="0"/>
+          </a:p>
+          <a:p>
+            <a:r>
+              <a:rPr lang="en-US" dirty="0"/>
+              <a:t>A common occurrence when we realize we’ve modeled incorrectly</a:t>
+            </a:r>
+          </a:p>
+          <a:p>
+            <a:r>
+              <a:rPr lang="en-US" dirty="0"/>
+              <a:t>Multiple types of information are in one column</a:t>
+            </a:r>
+          </a:p>
+          <a:p>
+            <a:r>
+              <a:rPr lang="en-US" dirty="0"/>
+              <a:t>We are becoming more normalized</a:t>
             </a:r>
           </a:p>
         </p:txBody>
@@ -16697,7 +16643,7 @@
     </p:spTree>
     <p:extLst>
       <p:ext uri="{BB962C8B-B14F-4D97-AF65-F5344CB8AC3E}">
-        <p14:creationId xmlns:p14="http://schemas.microsoft.com/office/powerpoint/2010/main" val="4158583141"/>
+        <p14:creationId xmlns:p14="http://schemas.microsoft.com/office/powerpoint/2010/main" val="2265791813"/>
       </p:ext>
     </p:extLst>
   </p:cSld>
@@ -16741,7 +16687,7 @@
           <a:p>
             <a:r>
               <a:rPr lang="en-US" dirty="0"/>
-              <a:t>The Zero Downtime Process: Splits</a:t>
+              <a:t>The Typical Process</a:t>
             </a:r>
           </a:p>
         </p:txBody>
@@ -16759,26 +16705,20 @@
         <p:spPr/>
         <p:txBody>
           <a:bodyPr>
-            <a:normAutofit fontScale="70000" lnSpcReduction="20000"/>
+            <a:normAutofit fontScale="85000" lnSpcReduction="20000"/>
           </a:bodyPr>
           <a:lstStyle/>
           <a:p>
             <a:r>
               <a:rPr lang="en-US" dirty="0"/>
-              <a:t>We trade space for time</a:t>
-            </a:r>
-          </a:p>
-          <a:p>
+              <a:t>We deploy this in one transaction:</a:t>
+            </a:r>
+          </a:p>
+          <a:p>
+            <a:pPr lvl="1"/>
             <a:r>
               <a:rPr lang="en-US" dirty="0"/>
-              <a:t>We use multiple deployments</a:t>
-            </a:r>
-          </a:p>
-          <a:p>
-            <a:pPr lvl="1"/>
-            <a:r>
-              <a:rPr lang="en-US" dirty="0"/>
-              <a:t>1 - Add columns to the table: FirstName and </a:t>
+              <a:t>Add columns to the table: FirstName and </a:t>
             </a:r>
             <a:r>
               <a:rPr lang="en-US" dirty="0" err="1"/>
@@ -16790,7 +16730,7 @@
             <a:pPr lvl="1"/>
             <a:r>
               <a:rPr lang="en-US" dirty="0"/>
-              <a:t>2 - UPDATE the columns by splitting the data in </a:t>
+              <a:t>UPDATE the columns by splitting the data in </a:t>
             </a:r>
             <a:r>
               <a:rPr lang="en-US" dirty="0" err="1"/>
@@ -16799,57 +16739,66 @@
             <a:endParaRPr lang="en-US" dirty="0"/>
           </a:p>
           <a:p>
-            <a:pPr lvl="2"/>
+            <a:pPr lvl="1"/>
             <a:r>
               <a:rPr lang="en-US" dirty="0"/>
-              <a:t>2a – rename </a:t>
+              <a:t>Drop the </a:t>
             </a:r>
             <a:r>
               <a:rPr lang="en-US" dirty="0" err="1"/>
               <a:t>CustomerName</a:t>
             </a:r>
-            <a:endParaRPr lang="en-US" dirty="0"/>
+            <a:r>
+              <a:rPr lang="en-US" dirty="0"/>
+              <a:t> column</a:t>
+            </a:r>
+          </a:p>
+          <a:p>
+            <a:r>
+              <a:rPr lang="en-US" dirty="0"/>
+              <a:t>Challenges</a:t>
+            </a:r>
           </a:p>
           <a:p>
             <a:pPr lvl="1"/>
             <a:r>
               <a:rPr lang="en-US" dirty="0"/>
-              <a:t>3 - Drop the </a:t>
+              <a:t>We might have applications using </a:t>
             </a:r>
             <a:r>
               <a:rPr lang="en-US" dirty="0" err="1"/>
               <a:t>CustomerName</a:t>
             </a:r>
+            <a:endParaRPr lang="en-US" dirty="0"/>
+          </a:p>
+          <a:p>
+            <a:pPr lvl="1"/>
             <a:r>
               <a:rPr lang="en-US" dirty="0"/>
-              <a:t> column</a:t>
-            </a:r>
-          </a:p>
-          <a:p>
+              <a:t>The UPDATE statement might block users while running</a:t>
+            </a:r>
+          </a:p>
+          <a:p>
+            <a:pPr lvl="1"/>
             <a:r>
               <a:rPr lang="en-US" dirty="0"/>
-              <a:t>Advantages</a:t>
-            </a:r>
-          </a:p>
-          <a:p>
-            <a:pPr lvl="1"/>
+              <a:t>We will not split some data properly (</a:t>
+            </a:r>
+            <a:r>
+              <a:rPr lang="en-US" b="0" i="0" dirty="0">
+                <a:effectLst/>
+              </a:rPr>
+              <a:t>George </a:t>
+            </a:r>
+            <a:r>
+              <a:rPr lang="en-US" i="0" dirty="0">
+                <a:effectLst/>
+              </a:rPr>
+              <a:t>von Trapp</a:t>
+            </a:r>
             <a:r>
               <a:rPr lang="en-US" dirty="0"/>
-              <a:t>We can start this move independently of the application</a:t>
-            </a:r>
-          </a:p>
-          <a:p>
-            <a:pPr lvl="1"/>
-            <a:r>
-              <a:rPr lang="en-US" dirty="0"/>
-              <a:t>We can batch the update if needed</a:t>
-            </a:r>
-          </a:p>
-          <a:p>
-            <a:pPr lvl="1"/>
-            <a:r>
-              <a:rPr lang="en-US" dirty="0"/>
-              <a:t>We can delay the final step until ready</a:t>
+              <a:t>)</a:t>
             </a:r>
           </a:p>
         </p:txBody>
@@ -16857,7 +16806,7 @@
     </p:spTree>
     <p:extLst>
       <p:ext uri="{BB962C8B-B14F-4D97-AF65-F5344CB8AC3E}">
-        <p14:creationId xmlns:p14="http://schemas.microsoft.com/office/powerpoint/2010/main" val="3085796512"/>
+        <p14:creationId xmlns:p14="http://schemas.microsoft.com/office/powerpoint/2010/main" val="1577561528"/>
       </p:ext>
     </p:extLst>
   </p:cSld>
@@ -16886,7 +16835,7 @@
       </p:grpSpPr>
       <p:sp>
         <p:nvSpPr>
-          <p:cNvPr id="2" name="Title 1"/>
+          <p:cNvPr id="4" name="Title 3"/>
           <p:cNvSpPr>
             <a:spLocks noGrp="1"/>
           </p:cNvSpPr>
@@ -16901,56 +16850,29 @@
           <a:p>
             <a:r>
               <a:rPr lang="en-US" dirty="0"/>
-              <a:t>Splitting Tables</a:t>
-            </a:r>
-          </a:p>
-        </p:txBody>
-      </p:sp>
-      <p:sp>
-        <p:nvSpPr>
-          <p:cNvPr id="3" name="Content Placeholder 2"/>
-          <p:cNvSpPr>
-            <a:spLocks noGrp="1"/>
-          </p:cNvSpPr>
-          <p:nvPr>
-            <p:ph idx="1"/>
-          </p:nvPr>
-        </p:nvSpPr>
-        <p:spPr/>
-        <p:txBody>
-          <a:bodyPr>
-            <a:normAutofit/>
-          </a:bodyPr>
-          <a:lstStyle/>
-          <a:p>
-            <a:r>
-              <a:rPr lang="en-US" sz="2800" dirty="0"/>
-              <a:t>The process is similar for splitting tables</a:t>
-            </a:r>
-          </a:p>
-          <a:p>
-            <a:r>
-              <a:rPr lang="en-US" sz="2800" dirty="0"/>
-              <a:t>Add a new table, use triggers to sync data</a:t>
-            </a:r>
-          </a:p>
-          <a:p>
-            <a:pPr lvl="1"/>
-            <a:r>
-              <a:rPr lang="en-US" sz="2400" dirty="0"/>
-              <a:t>Only columns being moved</a:t>
-            </a:r>
-          </a:p>
-          <a:p>
-            <a:r>
-              <a:rPr lang="en-US" sz="2800" dirty="0"/>
-              <a:t>Remove the columns from the original table later</a:t>
-            </a:r>
-          </a:p>
-          <a:p>
-            <a:r>
-              <a:rPr lang="en-US" sz="2800" dirty="0"/>
-              <a:t>Coordinate with apps to ensure feature toggles all flip</a:t>
+              <a:t>Demo</a:t>
+            </a:r>
+          </a:p>
+        </p:txBody>
+      </p:sp>
+      <p:sp>
+        <p:nvSpPr>
+          <p:cNvPr id="5" name="Text Placeholder 4"/>
+          <p:cNvSpPr>
+            <a:spLocks noGrp="1"/>
+          </p:cNvSpPr>
+          <p:nvPr>
+            <p:ph type="body" idx="1"/>
+          </p:nvPr>
+        </p:nvSpPr>
+        <p:spPr/>
+        <p:txBody>
+          <a:bodyPr/>
+          <a:lstStyle/>
+          <a:p>
+            <a:r>
+              <a:rPr lang="en-US" dirty="0"/>
+              <a:t>Splitting a column</a:t>
             </a:r>
           </a:p>
         </p:txBody>
@@ -16958,7 +16880,7 @@
     </p:spTree>
     <p:extLst>
       <p:ext uri="{BB962C8B-B14F-4D97-AF65-F5344CB8AC3E}">
-        <p14:creationId xmlns:p14="http://schemas.microsoft.com/office/powerpoint/2010/main" val="4254074986"/>
+        <p14:creationId xmlns:p14="http://schemas.microsoft.com/office/powerpoint/2010/main" val="4158583141"/>
       </p:ext>
     </p:extLst>
   </p:cSld>
@@ -17002,7 +16924,7 @@
           <a:p>
             <a:r>
               <a:rPr lang="en-US" dirty="0"/>
-              <a:t>Merges</a:t>
+              <a:t>The Zero Downtime Process: Splits</a:t>
             </a:r>
           </a:p>
         </p:txBody>
@@ -17020,53 +16942,97 @@
         <p:spPr/>
         <p:txBody>
           <a:bodyPr>
-            <a:normAutofit/>
+            <a:normAutofit fontScale="70000" lnSpcReduction="20000"/>
           </a:bodyPr>
           <a:lstStyle/>
           <a:p>
             <a:r>
-              <a:rPr lang="en-US" sz="2800" dirty="0"/>
-              <a:t>A merge is the reverse of a split</a:t>
-            </a:r>
-          </a:p>
-          <a:p>
-            <a:r>
-              <a:rPr lang="en-US" sz="2800" dirty="0"/>
-              <a:t>Can be table or column level</a:t>
-            </a:r>
-          </a:p>
-          <a:p>
-            <a:r>
-              <a:rPr lang="en-US" sz="2800" dirty="0"/>
-              <a:t>Similar process</a:t>
+              <a:rPr lang="en-US" dirty="0"/>
+              <a:t>We trade space for time</a:t>
+            </a:r>
+          </a:p>
+          <a:p>
+            <a:r>
+              <a:rPr lang="en-US" dirty="0"/>
+              <a:t>We use multiple deployments</a:t>
             </a:r>
           </a:p>
           <a:p>
             <a:pPr lvl="1"/>
             <a:r>
-              <a:rPr lang="en-US" sz="2000" dirty="0"/>
-              <a:t>New storage location</a:t>
-            </a:r>
+              <a:rPr lang="en-US" dirty="0"/>
+              <a:t>1 - Add columns to the table: FirstName and </a:t>
+            </a:r>
+            <a:r>
+              <a:rPr lang="en-US" dirty="0" err="1"/>
+              <a:t>LastName</a:t>
+            </a:r>
+            <a:endParaRPr lang="en-US" dirty="0"/>
           </a:p>
           <a:p>
             <a:pPr lvl="1"/>
             <a:r>
-              <a:rPr lang="en-US" sz="2000" dirty="0"/>
-              <a:t>Merge data</a:t>
-            </a:r>
+              <a:rPr lang="en-US" dirty="0"/>
+              <a:t>2 - UPDATE the columns by splitting the data in </a:t>
+            </a:r>
+            <a:r>
+              <a:rPr lang="en-US" dirty="0" err="1"/>
+              <a:t>CustomerName</a:t>
+            </a:r>
+            <a:endParaRPr lang="en-US" dirty="0"/>
+          </a:p>
+          <a:p>
+            <a:pPr lvl="2"/>
+            <a:r>
+              <a:rPr lang="en-US" dirty="0"/>
+              <a:t>2a – rename </a:t>
+            </a:r>
+            <a:r>
+              <a:rPr lang="en-US" dirty="0" err="1"/>
+              <a:t>CustomerName</a:t>
+            </a:r>
+            <a:endParaRPr lang="en-US" dirty="0"/>
           </a:p>
           <a:p>
             <a:pPr lvl="1"/>
             <a:r>
-              <a:rPr lang="en-US" sz="2000" dirty="0"/>
-              <a:t>If possible, keep the original values</a:t>
+              <a:rPr lang="en-US" dirty="0"/>
+              <a:t>3 - Drop the </a:t>
+            </a:r>
+            <a:r>
+              <a:rPr lang="en-US" dirty="0" err="1"/>
+              <a:t>CustomerName</a:t>
+            </a:r>
+            <a:r>
+              <a:rPr lang="en-US" dirty="0"/>
+              <a:t> column</a:t>
+            </a:r>
+          </a:p>
+          <a:p>
+            <a:r>
+              <a:rPr lang="en-US" dirty="0"/>
+              <a:t>Advantages</a:t>
             </a:r>
           </a:p>
           <a:p>
             <a:pPr lvl="1"/>
             <a:r>
-              <a:rPr lang="en-US" sz="2000" dirty="0"/>
-              <a:t>Drops occur later</a:t>
+              <a:rPr lang="en-US" dirty="0"/>
+              <a:t>We can start this move independently of the application</a:t>
+            </a:r>
+          </a:p>
+          <a:p>
+            <a:pPr lvl="1"/>
+            <a:r>
+              <a:rPr lang="en-US" dirty="0"/>
+              <a:t>We can batch the update if needed</a:t>
+            </a:r>
+          </a:p>
+          <a:p>
+            <a:pPr lvl="1"/>
+            <a:r>
+              <a:rPr lang="en-US" dirty="0"/>
+              <a:t>We can delay the final step until ready</a:t>
             </a:r>
           </a:p>
         </p:txBody>
@@ -17074,7 +17040,7 @@
     </p:spTree>
     <p:extLst>
       <p:ext uri="{BB962C8B-B14F-4D97-AF65-F5344CB8AC3E}">
-        <p14:creationId xmlns:p14="http://schemas.microsoft.com/office/powerpoint/2010/main" val="1249254835"/>
+        <p14:creationId xmlns:p14="http://schemas.microsoft.com/office/powerpoint/2010/main" val="3085796512"/>
       </p:ext>
     </p:extLst>
   </p:cSld>
@@ -17103,7 +17069,7 @@
       </p:grpSpPr>
       <p:sp>
         <p:nvSpPr>
-          <p:cNvPr id="4" name="Title 3"/>
+          <p:cNvPr id="2" name="Title 1"/>
           <p:cNvSpPr>
             <a:spLocks noGrp="1"/>
           </p:cNvSpPr>
@@ -17118,29 +17084,56 @@
           <a:p>
             <a:r>
               <a:rPr lang="en-US" dirty="0"/>
-              <a:t>Adding NOT NULL Columns</a:t>
-            </a:r>
-          </a:p>
-        </p:txBody>
-      </p:sp>
-      <p:sp>
-        <p:nvSpPr>
-          <p:cNvPr id="5" name="Text Placeholder 4"/>
-          <p:cNvSpPr>
-            <a:spLocks noGrp="1"/>
-          </p:cNvSpPr>
-          <p:nvPr>
-            <p:ph type="body" idx="1"/>
-          </p:nvPr>
-        </p:nvSpPr>
-        <p:spPr/>
-        <p:txBody>
-          <a:bodyPr/>
-          <a:lstStyle/>
-          <a:p>
-            <a:r>
-              <a:rPr lang="en-US" dirty="0"/>
-              <a:t>Tracking data changes</a:t>
+              <a:t>Splitting Tables</a:t>
+            </a:r>
+          </a:p>
+        </p:txBody>
+      </p:sp>
+      <p:sp>
+        <p:nvSpPr>
+          <p:cNvPr id="3" name="Content Placeholder 2"/>
+          <p:cNvSpPr>
+            <a:spLocks noGrp="1"/>
+          </p:cNvSpPr>
+          <p:nvPr>
+            <p:ph idx="1"/>
+          </p:nvPr>
+        </p:nvSpPr>
+        <p:spPr/>
+        <p:txBody>
+          <a:bodyPr>
+            <a:normAutofit/>
+          </a:bodyPr>
+          <a:lstStyle/>
+          <a:p>
+            <a:r>
+              <a:rPr lang="en-US" sz="2800" dirty="0"/>
+              <a:t>The process is similar for splitting tables</a:t>
+            </a:r>
+          </a:p>
+          <a:p>
+            <a:r>
+              <a:rPr lang="en-US" sz="2800" dirty="0"/>
+              <a:t>Add a new table, use triggers to sync data</a:t>
+            </a:r>
+          </a:p>
+          <a:p>
+            <a:pPr lvl="1"/>
+            <a:r>
+              <a:rPr lang="en-US" sz="2400" dirty="0"/>
+              <a:t>Only columns being moved</a:t>
+            </a:r>
+          </a:p>
+          <a:p>
+            <a:r>
+              <a:rPr lang="en-US" sz="2800" dirty="0"/>
+              <a:t>Remove the columns from the original table later</a:t>
+            </a:r>
+          </a:p>
+          <a:p>
+            <a:r>
+              <a:rPr lang="en-US" sz="2800" dirty="0"/>
+              <a:t>Coordinate with apps to ensure feature toggles all flip</a:t>
             </a:r>
           </a:p>
         </p:txBody>
@@ -17148,7 +17141,7 @@
     </p:spTree>
     <p:extLst>
       <p:ext uri="{BB962C8B-B14F-4D97-AF65-F5344CB8AC3E}">
-        <p14:creationId xmlns:p14="http://schemas.microsoft.com/office/powerpoint/2010/main" val="2363940147"/>
+        <p14:creationId xmlns:p14="http://schemas.microsoft.com/office/powerpoint/2010/main" val="4254074986"/>
       </p:ext>
     </p:extLst>
   </p:cSld>
@@ -17313,7 +17306,7 @@
           <a:p>
             <a:r>
               <a:rPr lang="en-US" dirty="0"/>
-              <a:t>The Scenario</a:t>
+              <a:t>Merges</a:t>
             </a:r>
           </a:p>
         </p:txBody>
@@ -17331,84 +17324,61 @@
         <p:spPr/>
         <p:txBody>
           <a:bodyPr>
-            <a:normAutofit fontScale="70000" lnSpcReduction="20000"/>
+            <a:normAutofit/>
           </a:bodyPr>
           <a:lstStyle/>
           <a:p>
             <a:r>
-              <a:rPr lang="en-US" dirty="0"/>
-              <a:t>Avoiding NULLs is often a good idea</a:t>
-            </a:r>
-          </a:p>
-          <a:p>
-            <a:r>
-              <a:rPr lang="en-US" dirty="0"/>
-              <a:t>We want to add a new column to a table that is NOT NULL</a:t>
-            </a:r>
-          </a:p>
-          <a:p>
-            <a:r>
-              <a:rPr lang="en-US" dirty="0"/>
-              <a:t>Two ways to do this (platform dependent):</a:t>
-            </a:r>
-          </a:p>
-          <a:p>
-            <a:r>
-              <a:rPr lang="en-US" dirty="0"/>
-              <a:t>Two-step process</a:t>
+              <a:rPr lang="en-US" sz="2800" dirty="0"/>
+              <a:t>A merge is the reverse of a split</a:t>
+            </a:r>
+          </a:p>
+          <a:p>
+            <a:r>
+              <a:rPr lang="en-US" sz="2800" dirty="0"/>
+              <a:t>Can be table or column level</a:t>
+            </a:r>
+          </a:p>
+          <a:p>
+            <a:r>
+              <a:rPr lang="en-US" sz="2800" dirty="0"/>
+              <a:t>Similar process</a:t>
             </a:r>
           </a:p>
           <a:p>
             <a:pPr lvl="1"/>
             <a:r>
-              <a:rPr lang="en-US" dirty="0"/>
-              <a:t>Add a NOT NULL column with a default</a:t>
+              <a:rPr lang="en-US" sz="2000" dirty="0"/>
+              <a:t>New storage location</a:t>
             </a:r>
           </a:p>
           <a:p>
             <a:pPr lvl="1"/>
             <a:r>
-              <a:rPr lang="en-US" dirty="0"/>
-              <a:t>Fix existing rows</a:t>
-            </a:r>
-          </a:p>
-          <a:p>
-            <a:r>
-              <a:rPr lang="en-US" dirty="0"/>
-              <a:t>Three-step process: </a:t>
+              <a:rPr lang="en-US" sz="2000" dirty="0"/>
+              <a:t>Merge data</a:t>
             </a:r>
           </a:p>
           <a:p>
             <a:pPr lvl="1"/>
             <a:r>
-              <a:rPr lang="en-US" dirty="0"/>
-              <a:t>Add a NULL column</a:t>
+              <a:rPr lang="en-US" sz="2000" dirty="0"/>
+              <a:t>If possible, keep the original values</a:t>
             </a:r>
           </a:p>
           <a:p>
             <a:pPr lvl="1"/>
             <a:r>
-              <a:rPr lang="en-US" dirty="0"/>
-              <a:t>Update existing rows with some value</a:t>
-            </a:r>
-          </a:p>
-          <a:p>
-            <a:pPr lvl="1"/>
-            <a:r>
-              <a:rPr lang="en-US" dirty="0"/>
-              <a:t>Change to NOT NULL</a:t>
-            </a:r>
-          </a:p>
-          <a:p>
-            <a:pPr lvl="1"/>
-            <a:endParaRPr lang="en-US" dirty="0"/>
+              <a:rPr lang="en-US" sz="2000" dirty="0"/>
+              <a:t>Drops occur later</a:t>
+            </a:r>
           </a:p>
         </p:txBody>
       </p:sp>
     </p:spTree>
     <p:extLst>
       <p:ext uri="{BB962C8B-B14F-4D97-AF65-F5344CB8AC3E}">
-        <p14:creationId xmlns:p14="http://schemas.microsoft.com/office/powerpoint/2010/main" val="2305389703"/>
+        <p14:creationId xmlns:p14="http://schemas.microsoft.com/office/powerpoint/2010/main" val="1249254835"/>
       </p:ext>
     </p:extLst>
   </p:cSld>
@@ -17452,7 +17422,7 @@
           <a:p>
             <a:r>
               <a:rPr lang="en-US" dirty="0"/>
-              <a:t>Demo</a:t>
+              <a:t>Adding NOT NULL Columns</a:t>
             </a:r>
           </a:p>
         </p:txBody>
@@ -17474,7 +17444,7 @@
           <a:p>
             <a:r>
               <a:rPr lang="en-US" dirty="0"/>
-              <a:t>Adding NOT NULL columns</a:t>
+              <a:t>Tracking data changes</a:t>
             </a:r>
           </a:p>
         </p:txBody>
@@ -17482,7 +17452,7 @@
     </p:spTree>
     <p:extLst>
       <p:ext uri="{BB962C8B-B14F-4D97-AF65-F5344CB8AC3E}">
-        <p14:creationId xmlns:p14="http://schemas.microsoft.com/office/powerpoint/2010/main" val="3339121514"/>
+        <p14:creationId xmlns:p14="http://schemas.microsoft.com/office/powerpoint/2010/main" val="2363940147"/>
       </p:ext>
     </p:extLst>
   </p:cSld>
@@ -17526,7 +17496,7 @@
           <a:p>
             <a:r>
               <a:rPr lang="en-US" dirty="0"/>
-              <a:t>The Zero Downtime Process</a:t>
+              <a:t>The Scenario</a:t>
             </a:r>
           </a:p>
         </p:txBody>
@@ -17544,54 +17514,84 @@
         <p:spPr/>
         <p:txBody>
           <a:bodyPr>
-            <a:normAutofit/>
+            <a:normAutofit fontScale="70000" lnSpcReduction="20000"/>
           </a:bodyPr>
           <a:lstStyle/>
           <a:p>
             <a:r>
-              <a:rPr lang="en-US" sz="2800" dirty="0"/>
-              <a:t>Feature Flag the application</a:t>
-            </a:r>
-          </a:p>
-          <a:p>
-            <a:r>
-              <a:rPr lang="en-US" sz="2800" dirty="0"/>
-              <a:t>Use 2 or 3 Deployments</a:t>
+              <a:rPr lang="en-US" dirty="0"/>
+              <a:t>Avoiding NULLs is often a good idea</a:t>
+            </a:r>
+          </a:p>
+          <a:p>
+            <a:r>
+              <a:rPr lang="en-US" dirty="0"/>
+              <a:t>We want to add a new column to a table that is NOT NULL</a:t>
+            </a:r>
+          </a:p>
+          <a:p>
+            <a:r>
+              <a:rPr lang="en-US" dirty="0"/>
+              <a:t>Two ways to do this (platform dependent):</a:t>
+            </a:r>
+          </a:p>
+          <a:p>
+            <a:r>
+              <a:rPr lang="en-US" dirty="0"/>
+              <a:t>Two-step process</a:t>
             </a:r>
           </a:p>
           <a:p>
             <a:pPr lvl="1"/>
             <a:r>
-              <a:rPr lang="en-US" sz="2400" dirty="0"/>
+              <a:rPr lang="en-US" dirty="0"/>
+              <a:t>Add a NOT NULL column with a default</a:t>
+            </a:r>
+          </a:p>
+          <a:p>
+            <a:pPr lvl="1"/>
+            <a:r>
+              <a:rPr lang="en-US" dirty="0"/>
+              <a:t>Fix existing rows</a:t>
+            </a:r>
+          </a:p>
+          <a:p>
+            <a:r>
+              <a:rPr lang="en-US" dirty="0"/>
+              <a:t>Three-step process: </a:t>
+            </a:r>
+          </a:p>
+          <a:p>
+            <a:pPr lvl="1"/>
+            <a:r>
+              <a:rPr lang="en-US" dirty="0"/>
               <a:t>Add a NULL column</a:t>
             </a:r>
           </a:p>
           <a:p>
             <a:pPr lvl="1"/>
             <a:r>
-              <a:rPr lang="en-US" sz="2400" dirty="0"/>
-              <a:t>Update data/defaults</a:t>
+              <a:rPr lang="en-US" dirty="0"/>
+              <a:t>Update existing rows with some value</a:t>
             </a:r>
           </a:p>
           <a:p>
             <a:pPr lvl="1"/>
             <a:r>
-              <a:rPr lang="en-US" sz="2400" dirty="0"/>
+              <a:rPr lang="en-US" dirty="0"/>
               <a:t>Change to NOT NULL</a:t>
             </a:r>
           </a:p>
           <a:p>
-            <a:r>
-              <a:rPr lang="en-US" sz="2800" dirty="0"/>
-              <a:t>Make sure you understand how the app behaves with NULL/default/incomplete data</a:t>
-            </a:r>
+            <a:pPr lvl="1"/>
+            <a:endParaRPr lang="en-US" dirty="0"/>
           </a:p>
         </p:txBody>
       </p:sp>
     </p:spTree>
     <p:extLst>
       <p:ext uri="{BB962C8B-B14F-4D97-AF65-F5344CB8AC3E}">
-        <p14:creationId xmlns:p14="http://schemas.microsoft.com/office/powerpoint/2010/main" val="3218896661"/>
+        <p14:creationId xmlns:p14="http://schemas.microsoft.com/office/powerpoint/2010/main" val="2305389703"/>
       </p:ext>
     </p:extLst>
   </p:cSld>
@@ -17635,7 +17635,7 @@
           <a:p>
             <a:r>
               <a:rPr lang="en-US" dirty="0"/>
-              <a:t>Renaming</a:t>
+              <a:t>Demo</a:t>
             </a:r>
           </a:p>
         </p:txBody>
@@ -17657,7 +17657,7 @@
           <a:p>
             <a:r>
               <a:rPr lang="en-US" dirty="0"/>
-              <a:t>Don’t do this, but if you must…</a:t>
+              <a:t>Adding NOT NULL columns</a:t>
             </a:r>
           </a:p>
         </p:txBody>
@@ -17665,7 +17665,7 @@
     </p:spTree>
     <p:extLst>
       <p:ext uri="{BB962C8B-B14F-4D97-AF65-F5344CB8AC3E}">
-        <p14:creationId xmlns:p14="http://schemas.microsoft.com/office/powerpoint/2010/main" val="883467512"/>
+        <p14:creationId xmlns:p14="http://schemas.microsoft.com/office/powerpoint/2010/main" val="3339121514"/>
       </p:ext>
     </p:extLst>
   </p:cSld>
@@ -17709,7 +17709,7 @@
           <a:p>
             <a:r>
               <a:rPr lang="en-US" dirty="0"/>
-              <a:t>The Scenario</a:t>
+              <a:t>The Zero Downtime Process</a:t>
             </a:r>
           </a:p>
         </p:txBody>
@@ -17733,84 +17733,40 @@
           <a:p>
             <a:r>
               <a:rPr lang="en-US" sz="2800" dirty="0"/>
-              <a:t>Someone doesn’t like a column name</a:t>
+              <a:t>Feature Flag the application</a:t>
             </a:r>
           </a:p>
           <a:p>
             <a:r>
               <a:rPr lang="en-US" sz="2800" dirty="0"/>
-              <a:t>They want to change the name to something else</a:t>
+              <a:t>Use 2 or 3 Deployments</a:t>
             </a:r>
           </a:p>
           <a:p>
             <a:pPr lvl="1"/>
             <a:r>
-              <a:rPr lang="en-US" sz="2000" dirty="0">
-                <a:latin typeface="Calibri" panose="020F0502020204030204" pitchFamily="34" charset="0"/>
-                <a:cs typeface="Calibri" panose="020F0502020204030204" pitchFamily="34" charset="0"/>
-              </a:rPr>
-              <a:t>Currently </a:t>
-            </a:r>
-            <a:r>
-              <a:rPr lang="en-US" sz="2000" dirty="0" err="1">
-                <a:latin typeface="Calibri" panose="020F0502020204030204" pitchFamily="34" charset="0"/>
-                <a:cs typeface="Calibri" panose="020F0502020204030204" pitchFamily="34" charset="0"/>
-              </a:rPr>
-              <a:t>dbo.OrderHeader.OrderDate</a:t>
-            </a:r>
-            <a:endParaRPr lang="en-US" sz="2000" dirty="0">
-              <a:latin typeface="Calibri" panose="020F0502020204030204" pitchFamily="34" charset="0"/>
-              <a:cs typeface="Calibri" panose="020F0502020204030204" pitchFamily="34" charset="0"/>
-            </a:endParaRPr>
+              <a:rPr lang="en-US" sz="2400" dirty="0"/>
+              <a:t>Add a NULL column</a:t>
+            </a:r>
           </a:p>
           <a:p>
             <a:pPr lvl="1"/>
             <a:r>
-              <a:rPr lang="en-US" sz="2000" dirty="0">
-                <a:latin typeface="Calibri" panose="020F0502020204030204" pitchFamily="34" charset="0"/>
-                <a:cs typeface="Calibri" panose="020F0502020204030204" pitchFamily="34" charset="0"/>
-              </a:rPr>
-              <a:t>Change to: </a:t>
-            </a:r>
-            <a:r>
-              <a:rPr lang="en-US" sz="2000" dirty="0" err="1">
-                <a:latin typeface="Calibri" panose="020F0502020204030204" pitchFamily="34" charset="0"/>
-                <a:cs typeface="Calibri" panose="020F0502020204030204" pitchFamily="34" charset="0"/>
-              </a:rPr>
-              <a:t>dbo.OrderHeader.OrderedbyDate</a:t>
-            </a:r>
-            <a:endParaRPr lang="en-US" sz="2000" dirty="0">
-              <a:latin typeface="Calibri" panose="020F0502020204030204" pitchFamily="34" charset="0"/>
-              <a:cs typeface="Calibri" panose="020F0502020204030204" pitchFamily="34" charset="0"/>
-            </a:endParaRPr>
-          </a:p>
-          <a:p>
-            <a:r>
-              <a:rPr lang="en-US" sz="2400" dirty="0">
-                <a:latin typeface="Calibri" panose="020F0502020204030204" pitchFamily="34" charset="0"/>
-                <a:cs typeface="Calibri" panose="020F0502020204030204" pitchFamily="34" charset="0"/>
-              </a:rPr>
-              <a:t>NOTE: You should NEVER need to do this</a:t>
+              <a:rPr lang="en-US" sz="2400" dirty="0"/>
+              <a:t>Update data/defaults</a:t>
             </a:r>
           </a:p>
           <a:p>
             <a:pPr lvl="1"/>
             <a:r>
-              <a:rPr lang="en-US" sz="2000" dirty="0">
-                <a:latin typeface="Calibri" panose="020F0502020204030204" pitchFamily="34" charset="0"/>
-                <a:cs typeface="Calibri" panose="020F0502020204030204" pitchFamily="34" charset="0"/>
-              </a:rPr>
-              <a:t>We have aliases</a:t>
-            </a:r>
-          </a:p>
-          <a:p>
-            <a:pPr lvl="1"/>
-            <a:r>
-              <a:rPr lang="en-US" sz="2000" dirty="0">
-                <a:latin typeface="Calibri" panose="020F0502020204030204" pitchFamily="34" charset="0"/>
-                <a:cs typeface="Calibri" panose="020F0502020204030204" pitchFamily="34" charset="0"/>
-              </a:rPr>
-              <a:t>We an adjust ordering, naming, etc. in queries</a:t>
+              <a:rPr lang="en-US" sz="2400" dirty="0"/>
+              <a:t>Change to NOT NULL</a:t>
+            </a:r>
+          </a:p>
+          <a:p>
+            <a:r>
+              <a:rPr lang="en-US" sz="2800" dirty="0"/>
+              <a:t>Make sure you understand how the app behaves with NULL/default/incomplete data</a:t>
             </a:r>
           </a:p>
         </p:txBody>
@@ -17818,7 +17774,7 @@
     </p:spTree>
     <p:extLst>
       <p:ext uri="{BB962C8B-B14F-4D97-AF65-F5344CB8AC3E}">
-        <p14:creationId xmlns:p14="http://schemas.microsoft.com/office/powerpoint/2010/main" val="2219010026"/>
+        <p14:creationId xmlns:p14="http://schemas.microsoft.com/office/powerpoint/2010/main" val="3218896661"/>
       </p:ext>
     </p:extLst>
   </p:cSld>
@@ -17847,7 +17803,7 @@
       </p:grpSpPr>
       <p:sp>
         <p:nvSpPr>
-          <p:cNvPr id="2" name="Title 1"/>
+          <p:cNvPr id="4" name="Title 3"/>
           <p:cNvSpPr>
             <a:spLocks noGrp="1"/>
           </p:cNvSpPr>
@@ -17862,112 +17818,29 @@
           <a:p>
             <a:r>
               <a:rPr lang="en-US" dirty="0"/>
-              <a:t>The Typical Process</a:t>
-            </a:r>
-          </a:p>
-        </p:txBody>
-      </p:sp>
-      <p:sp>
-        <p:nvSpPr>
-          <p:cNvPr id="3" name="Content Placeholder 2"/>
-          <p:cNvSpPr>
-            <a:spLocks noGrp="1"/>
-          </p:cNvSpPr>
-          <p:nvPr>
-            <p:ph idx="1"/>
-          </p:nvPr>
-        </p:nvSpPr>
-        <p:spPr/>
-        <p:txBody>
-          <a:bodyPr>
-            <a:normAutofit/>
-          </a:bodyPr>
-          <a:lstStyle/>
-          <a:p>
-            <a:r>
-              <a:rPr lang="en-US" sz="2400" dirty="0">
-                <a:latin typeface="Calibri" panose="020F0502020204030204" pitchFamily="34" charset="0"/>
-                <a:cs typeface="Calibri" panose="020F0502020204030204" pitchFamily="34" charset="0"/>
-              </a:rPr>
-              <a:t>Multiple options here (platform dependent):</a:t>
-            </a:r>
-          </a:p>
-          <a:p>
-            <a:r>
-              <a:rPr lang="en-US" sz="2400" dirty="0">
-                <a:latin typeface="Calibri" panose="020F0502020204030204" pitchFamily="34" charset="0"/>
-                <a:cs typeface="Calibri" panose="020F0502020204030204" pitchFamily="34" charset="0"/>
-              </a:rPr>
-              <a:t>Often, we use a rename procedure (</a:t>
-            </a:r>
-            <a:r>
-              <a:rPr lang="en-US" sz="2400" dirty="0" err="1">
-                <a:latin typeface="Calibri" panose="020F0502020204030204" pitchFamily="34" charset="0"/>
-                <a:cs typeface="Calibri" panose="020F0502020204030204" pitchFamily="34" charset="0"/>
-              </a:rPr>
-              <a:t>s</a:t>
-            </a:r>
-            <a:r>
-              <a:rPr lang="en-US" sz="2100" dirty="0" err="1">
-                <a:latin typeface="Calibri" panose="020F0502020204030204" pitchFamily="34" charset="0"/>
-                <a:cs typeface="Calibri" panose="020F0502020204030204" pitchFamily="34" charset="0"/>
-              </a:rPr>
-              <a:t>p_rename</a:t>
-            </a:r>
-            <a:r>
-              <a:rPr lang="en-US" sz="2100" dirty="0">
-                <a:latin typeface="Calibri" panose="020F0502020204030204" pitchFamily="34" charset="0"/>
-                <a:cs typeface="Calibri" panose="020F0502020204030204" pitchFamily="34" charset="0"/>
-              </a:rPr>
-              <a:t>)</a:t>
-            </a:r>
-          </a:p>
-          <a:p>
-            <a:r>
-              <a:rPr lang="en-US" sz="2500" dirty="0">
-                <a:latin typeface="Calibri" panose="020F0502020204030204" pitchFamily="34" charset="0"/>
-                <a:cs typeface="Calibri" panose="020F0502020204030204" pitchFamily="34" charset="0"/>
-              </a:rPr>
-              <a:t>We can use the swap variable process:</a:t>
-            </a:r>
-          </a:p>
-          <a:p>
-            <a:pPr lvl="1"/>
-            <a:r>
-              <a:rPr lang="en-US" sz="2100" dirty="0">
-                <a:latin typeface="Calibri" panose="020F0502020204030204" pitchFamily="34" charset="0"/>
-                <a:cs typeface="Calibri" panose="020F0502020204030204" pitchFamily="34" charset="0"/>
-              </a:rPr>
-              <a:t>Multi-step (add new, rename old, rename new, drop old)</a:t>
-            </a:r>
-          </a:p>
-          <a:p>
-            <a:r>
-              <a:rPr lang="en-US" sz="2500" dirty="0">
-                <a:latin typeface="Calibri" panose="020F0502020204030204" pitchFamily="34" charset="0"/>
-                <a:cs typeface="Calibri" panose="020F0502020204030204" pitchFamily="34" charset="0"/>
-              </a:rPr>
-              <a:t>Challenges</a:t>
-            </a:r>
-          </a:p>
-          <a:p>
-            <a:pPr lvl="1"/>
-            <a:r>
-              <a:rPr lang="en-US" sz="2100" dirty="0">
-                <a:latin typeface="Calibri" panose="020F0502020204030204" pitchFamily="34" charset="0"/>
-                <a:cs typeface="Calibri" panose="020F0502020204030204" pitchFamily="34" charset="0"/>
-              </a:rPr>
-              <a:t>Updating all app calls challenging</a:t>
-            </a:r>
-          </a:p>
-          <a:p>
-            <a:pPr lvl="1"/>
-            <a:r>
-              <a:rPr lang="en-US" sz="2100" dirty="0">
-                <a:latin typeface="Calibri" panose="020F0502020204030204" pitchFamily="34" charset="0"/>
-                <a:cs typeface="Calibri" panose="020F0502020204030204" pitchFamily="34" charset="0"/>
-              </a:rPr>
-              <a:t>We might deploy and rollback many times</a:t>
+              <a:t>Renaming</a:t>
+            </a:r>
+          </a:p>
+        </p:txBody>
+      </p:sp>
+      <p:sp>
+        <p:nvSpPr>
+          <p:cNvPr id="5" name="Text Placeholder 4"/>
+          <p:cNvSpPr>
+            <a:spLocks noGrp="1"/>
+          </p:cNvSpPr>
+          <p:nvPr>
+            <p:ph type="body" idx="1"/>
+          </p:nvPr>
+        </p:nvSpPr>
+        <p:spPr/>
+        <p:txBody>
+          <a:bodyPr/>
+          <a:lstStyle/>
+          <a:p>
+            <a:r>
+              <a:rPr lang="en-US" dirty="0"/>
+              <a:t>Don’t do this, but if you must…</a:t>
             </a:r>
           </a:p>
         </p:txBody>
@@ -17975,7 +17848,7 @@
     </p:spTree>
     <p:extLst>
       <p:ext uri="{BB962C8B-B14F-4D97-AF65-F5344CB8AC3E}">
-        <p14:creationId xmlns:p14="http://schemas.microsoft.com/office/powerpoint/2010/main" val="3995894110"/>
+        <p14:creationId xmlns:p14="http://schemas.microsoft.com/office/powerpoint/2010/main" val="883467512"/>
       </p:ext>
     </p:extLst>
   </p:cSld>
@@ -18004,7 +17877,7 @@
       </p:grpSpPr>
       <p:sp>
         <p:nvSpPr>
-          <p:cNvPr id="4" name="Title 3"/>
+          <p:cNvPr id="2" name="Title 1"/>
           <p:cNvSpPr>
             <a:spLocks noGrp="1"/>
           </p:cNvSpPr>
@@ -18019,29 +17892,108 @@
           <a:p>
             <a:r>
               <a:rPr lang="en-US" dirty="0"/>
-              <a:t>Demo</a:t>
-            </a:r>
-          </a:p>
-        </p:txBody>
-      </p:sp>
-      <p:sp>
-        <p:nvSpPr>
-          <p:cNvPr id="5" name="Text Placeholder 4"/>
-          <p:cNvSpPr>
-            <a:spLocks noGrp="1"/>
-          </p:cNvSpPr>
-          <p:nvPr>
-            <p:ph type="body" idx="1"/>
-          </p:nvPr>
-        </p:nvSpPr>
-        <p:spPr/>
-        <p:txBody>
-          <a:bodyPr/>
-          <a:lstStyle/>
-          <a:p>
-            <a:r>
-              <a:rPr lang="en-US" dirty="0"/>
-              <a:t>Renames</a:t>
+              <a:t>The Scenario</a:t>
+            </a:r>
+          </a:p>
+        </p:txBody>
+      </p:sp>
+      <p:sp>
+        <p:nvSpPr>
+          <p:cNvPr id="3" name="Content Placeholder 2"/>
+          <p:cNvSpPr>
+            <a:spLocks noGrp="1"/>
+          </p:cNvSpPr>
+          <p:nvPr>
+            <p:ph idx="1"/>
+          </p:nvPr>
+        </p:nvSpPr>
+        <p:spPr/>
+        <p:txBody>
+          <a:bodyPr>
+            <a:normAutofit/>
+          </a:bodyPr>
+          <a:lstStyle/>
+          <a:p>
+            <a:r>
+              <a:rPr lang="en-US" sz="2800" dirty="0"/>
+              <a:t>Someone doesn’t like a column name</a:t>
+            </a:r>
+          </a:p>
+          <a:p>
+            <a:r>
+              <a:rPr lang="en-US" sz="2800" dirty="0"/>
+              <a:t>They want to change the name to something else</a:t>
+            </a:r>
+          </a:p>
+          <a:p>
+            <a:pPr lvl="1"/>
+            <a:r>
+              <a:rPr lang="en-US" sz="2000" dirty="0">
+                <a:latin typeface="Calibri" panose="020F0502020204030204" pitchFamily="34" charset="0"/>
+                <a:cs typeface="Calibri" panose="020F0502020204030204" pitchFamily="34" charset="0"/>
+              </a:rPr>
+              <a:t>Currently </a:t>
+            </a:r>
+            <a:r>
+              <a:rPr lang="en-US" sz="2000" dirty="0" err="1">
+                <a:latin typeface="Calibri" panose="020F0502020204030204" pitchFamily="34" charset="0"/>
+                <a:cs typeface="Calibri" panose="020F0502020204030204" pitchFamily="34" charset="0"/>
+              </a:rPr>
+              <a:t>dbo.OrderHeader.OrderDate</a:t>
+            </a:r>
+            <a:endParaRPr lang="en-US" sz="2000" dirty="0">
+              <a:latin typeface="Calibri" panose="020F0502020204030204" pitchFamily="34" charset="0"/>
+              <a:cs typeface="Calibri" panose="020F0502020204030204" pitchFamily="34" charset="0"/>
+            </a:endParaRPr>
+          </a:p>
+          <a:p>
+            <a:pPr lvl="1"/>
+            <a:r>
+              <a:rPr lang="en-US" sz="2000" dirty="0">
+                <a:latin typeface="Calibri" panose="020F0502020204030204" pitchFamily="34" charset="0"/>
+                <a:cs typeface="Calibri" panose="020F0502020204030204" pitchFamily="34" charset="0"/>
+              </a:rPr>
+              <a:t>Change to: </a:t>
+            </a:r>
+            <a:r>
+              <a:rPr lang="en-US" sz="2000" dirty="0" err="1">
+                <a:latin typeface="Calibri" panose="020F0502020204030204" pitchFamily="34" charset="0"/>
+                <a:cs typeface="Calibri" panose="020F0502020204030204" pitchFamily="34" charset="0"/>
+              </a:rPr>
+              <a:t>dbo.OrderHeader.OrderedbyDate</a:t>
+            </a:r>
+            <a:endParaRPr lang="en-US" sz="2000" dirty="0">
+              <a:latin typeface="Calibri" panose="020F0502020204030204" pitchFamily="34" charset="0"/>
+              <a:cs typeface="Calibri" panose="020F0502020204030204" pitchFamily="34" charset="0"/>
+            </a:endParaRPr>
+          </a:p>
+          <a:p>
+            <a:r>
+              <a:rPr lang="en-US" sz="2400" dirty="0">
+                <a:latin typeface="Calibri" panose="020F0502020204030204" pitchFamily="34" charset="0"/>
+                <a:cs typeface="Calibri" panose="020F0502020204030204" pitchFamily="34" charset="0"/>
+              </a:rPr>
+              <a:t>NOTE: You should NEVER need to do this</a:t>
+            </a:r>
+          </a:p>
+          <a:p>
+            <a:pPr lvl="1"/>
+            <a:r>
+              <a:rPr lang="en-US" sz="2000" dirty="0">
+                <a:latin typeface="Calibri" panose="020F0502020204030204" pitchFamily="34" charset="0"/>
+                <a:cs typeface="Calibri" panose="020F0502020204030204" pitchFamily="34" charset="0"/>
+              </a:rPr>
+              <a:t>We have aliases</a:t>
+            </a:r>
+          </a:p>
+          <a:p>
+            <a:pPr lvl="1"/>
+            <a:r>
+              <a:rPr lang="en-US" sz="2000" dirty="0">
+                <a:latin typeface="Calibri" panose="020F0502020204030204" pitchFamily="34" charset="0"/>
+                <a:cs typeface="Calibri" panose="020F0502020204030204" pitchFamily="34" charset="0"/>
+              </a:rPr>
+              <a:t>We an adjust ordering, naming, etc. in queries</a:t>
             </a:r>
           </a:p>
         </p:txBody>
@@ -18049,7 +18001,7 @@
     </p:spTree>
     <p:extLst>
       <p:ext uri="{BB962C8B-B14F-4D97-AF65-F5344CB8AC3E}">
-        <p14:creationId xmlns:p14="http://schemas.microsoft.com/office/powerpoint/2010/main" val="3207381648"/>
+        <p14:creationId xmlns:p14="http://schemas.microsoft.com/office/powerpoint/2010/main" val="2219010026"/>
       </p:ext>
     </p:extLst>
   </p:cSld>
@@ -18088,154 +18040,125 @@
         </p:nvSpPr>
         <p:spPr/>
         <p:txBody>
+          <a:bodyPr/>
+          <a:lstStyle/>
+          <a:p>
+            <a:r>
+              <a:rPr lang="en-US" dirty="0"/>
+              <a:t>The Typical Process</a:t>
+            </a:r>
+          </a:p>
+        </p:txBody>
+      </p:sp>
+      <p:sp>
+        <p:nvSpPr>
+          <p:cNvPr id="3" name="Content Placeholder 2"/>
+          <p:cNvSpPr>
+            <a:spLocks noGrp="1"/>
+          </p:cNvSpPr>
+          <p:nvPr>
+            <p:ph idx="1"/>
+          </p:nvPr>
+        </p:nvSpPr>
+        <p:spPr/>
+        <p:txBody>
           <a:bodyPr>
-            <a:normAutofit fontScale="90000"/>
+            <a:normAutofit/>
           </a:bodyPr>
           <a:lstStyle/>
           <a:p>
             <a:r>
-              <a:rPr lang="en-US" dirty="0"/>
-              <a:t>The Zero Downtime Process: Renames</a:t>
-            </a:r>
-          </a:p>
-        </p:txBody>
-      </p:sp>
-      <p:sp>
-        <p:nvSpPr>
-          <p:cNvPr id="3" name="Content Placeholder 2"/>
-          <p:cNvSpPr>
-            <a:spLocks noGrp="1"/>
-          </p:cNvSpPr>
-          <p:nvPr>
-            <p:ph idx="1"/>
-          </p:nvPr>
-        </p:nvSpPr>
-        <p:spPr>
-          <a:xfrm>
-            <a:off x="457200" y="1123950"/>
-            <a:ext cx="8229600" cy="3394075"/>
-          </a:xfrm>
-        </p:spPr>
-        <p:txBody>
-          <a:bodyPr>
-            <a:normAutofit fontScale="55000" lnSpcReduction="20000"/>
-          </a:bodyPr>
-          <a:lstStyle/>
-          <a:p>
-            <a:r>
-              <a:rPr lang="en-US" dirty="0"/>
-              <a:t>If possible, a quick one-step is preferred</a:t>
+              <a:rPr lang="en-US" sz="2400" dirty="0">
+                <a:latin typeface="Calibri" panose="020F0502020204030204" pitchFamily="34" charset="0"/>
+                <a:cs typeface="Calibri" panose="020F0502020204030204" pitchFamily="34" charset="0"/>
+              </a:rPr>
+              <a:t>Multiple options here (platform dependent):</a:t>
+            </a:r>
+          </a:p>
+          <a:p>
+            <a:r>
+              <a:rPr lang="en-US" sz="2400" dirty="0">
+                <a:latin typeface="Calibri" panose="020F0502020204030204" pitchFamily="34" charset="0"/>
+                <a:cs typeface="Calibri" panose="020F0502020204030204" pitchFamily="34" charset="0"/>
+              </a:rPr>
+              <a:t>Often, we use a rename procedure (</a:t>
+            </a:r>
+            <a:r>
+              <a:rPr lang="en-US" sz="2400" dirty="0" err="1">
+                <a:latin typeface="Calibri" panose="020F0502020204030204" pitchFamily="34" charset="0"/>
+                <a:cs typeface="Calibri" panose="020F0502020204030204" pitchFamily="34" charset="0"/>
+              </a:rPr>
+              <a:t>s</a:t>
+            </a:r>
+            <a:r>
+              <a:rPr lang="en-US" sz="2100" dirty="0" err="1">
+                <a:latin typeface="Calibri" panose="020F0502020204030204" pitchFamily="34" charset="0"/>
+                <a:cs typeface="Calibri" panose="020F0502020204030204" pitchFamily="34" charset="0"/>
+              </a:rPr>
+              <a:t>p_rename</a:t>
+            </a:r>
+            <a:r>
+              <a:rPr lang="en-US" sz="2100" dirty="0">
+                <a:latin typeface="Calibri" panose="020F0502020204030204" pitchFamily="34" charset="0"/>
+                <a:cs typeface="Calibri" panose="020F0502020204030204" pitchFamily="34" charset="0"/>
+              </a:rPr>
+              <a:t>)</a:t>
+            </a:r>
+          </a:p>
+          <a:p>
+            <a:r>
+              <a:rPr lang="en-US" sz="2500" dirty="0">
+                <a:latin typeface="Calibri" panose="020F0502020204030204" pitchFamily="34" charset="0"/>
+                <a:cs typeface="Calibri" panose="020F0502020204030204" pitchFamily="34" charset="0"/>
+              </a:rPr>
+              <a:t>We can use the swap variable process:</a:t>
             </a:r>
           </a:p>
           <a:p>
             <a:pPr lvl="1"/>
             <a:r>
-              <a:rPr lang="en-US" dirty="0"/>
-              <a:t>Coordination with app is hard</a:t>
+              <a:rPr lang="en-US" sz="2100" dirty="0">
+                <a:latin typeface="Calibri" panose="020F0502020204030204" pitchFamily="34" charset="0"/>
+                <a:cs typeface="Calibri" panose="020F0502020204030204" pitchFamily="34" charset="0"/>
+              </a:rPr>
+              <a:t>Multi-step (add new, rename old, rename new, drop old)</a:t>
+            </a:r>
+          </a:p>
+          <a:p>
+            <a:r>
+              <a:rPr lang="en-US" sz="2500" dirty="0">
+                <a:latin typeface="Calibri" panose="020F0502020204030204" pitchFamily="34" charset="0"/>
+                <a:cs typeface="Calibri" panose="020F0502020204030204" pitchFamily="34" charset="0"/>
+              </a:rPr>
+              <a:t>Challenges</a:t>
             </a:r>
           </a:p>
           <a:p>
             <a:pPr lvl="1"/>
             <a:r>
-              <a:rPr lang="en-US" dirty="0"/>
-              <a:t>NOT Zero downtime usually</a:t>
-            </a:r>
-          </a:p>
-          <a:p>
-            <a:r>
-              <a:rPr lang="en-US" dirty="0"/>
-              <a:t>Use </a:t>
-            </a:r>
-            <a:r>
-              <a:rPr lang="en-US" dirty="0" err="1">
-                <a:hlinkClick r:id="rId2"/>
+              <a:rPr lang="en-US" sz="2100" dirty="0">
+                <a:latin typeface="Calibri" panose="020F0502020204030204" pitchFamily="34" charset="0"/>
+                <a:cs typeface="Calibri" panose="020F0502020204030204" pitchFamily="34" charset="0"/>
               </a:rPr>
-              <a:t>sp_rename</a:t>
-            </a:r>
-            <a:r>
-              <a:rPr lang="en-US" dirty="0"/>
-              <a:t> in SQL Server/Azure/Synapse</a:t>
+              <a:t>Updating all app calls challenging</a:t>
             </a:r>
           </a:p>
           <a:p>
             <a:pPr lvl="1"/>
             <a:r>
-              <a:rPr lang="en-US" dirty="0"/>
-              <a:t>Only if you are sure all apps can rev</a:t>
-            </a:r>
-          </a:p>
-          <a:p>
-            <a:pPr lvl="1"/>
-            <a:r>
-              <a:rPr lang="en-US" dirty="0"/>
-              <a:t>Verify this in testing</a:t>
-            </a:r>
-          </a:p>
-          <a:p>
-            <a:pPr lvl="1"/>
-            <a:r>
-              <a:rPr lang="en-US" dirty="0"/>
-              <a:t>Usually requires a deployment window so all apps can rev/toggle</a:t>
-            </a:r>
-          </a:p>
-          <a:p>
-            <a:r>
-              <a:rPr lang="en-US" dirty="0"/>
-              <a:t>Safer process is:</a:t>
-            </a:r>
-          </a:p>
-          <a:p>
-            <a:pPr lvl="1"/>
-            <a:r>
-              <a:rPr lang="en-US" dirty="0"/>
-              <a:t>Adding a new column/view</a:t>
-            </a:r>
-          </a:p>
-          <a:p>
-            <a:pPr lvl="1"/>
-            <a:r>
-              <a:rPr lang="en-US" dirty="0"/>
-              <a:t>Flip feature toggle in apps</a:t>
-            </a:r>
-          </a:p>
-          <a:p>
-            <a:pPr lvl="1"/>
-            <a:r>
-              <a:rPr lang="en-US" dirty="0"/>
-              <a:t>Use </a:t>
-            </a:r>
-            <a:r>
-              <a:rPr lang="en-US" dirty="0" err="1"/>
-              <a:t>xEvents</a:t>
-            </a:r>
-            <a:r>
-              <a:rPr lang="en-US" dirty="0"/>
-              <a:t> to check access to the old name (maybe)</a:t>
-            </a:r>
-          </a:p>
-          <a:p>
-            <a:pPr lvl="1"/>
-            <a:r>
-              <a:rPr lang="en-US" dirty="0"/>
-              <a:t>Search all code for the old name</a:t>
-            </a:r>
-          </a:p>
-          <a:p>
-            <a:pPr lvl="1"/>
-            <a:r>
-              <a:rPr lang="en-US" dirty="0"/>
-              <a:t>Drop the new col/view and rename the old one later</a:t>
-            </a:r>
-          </a:p>
-          <a:p>
-            <a:endParaRPr lang="en-US" dirty="0"/>
+              <a:rPr lang="en-US" sz="2100" dirty="0">
+                <a:latin typeface="Calibri" panose="020F0502020204030204" pitchFamily="34" charset="0"/>
+                <a:cs typeface="Calibri" panose="020F0502020204030204" pitchFamily="34" charset="0"/>
+              </a:rPr>
+              <a:t>We might deploy and rollback many times</a:t>
+            </a:r>
           </a:p>
         </p:txBody>
       </p:sp>
     </p:spTree>
     <p:extLst>
       <p:ext uri="{BB962C8B-B14F-4D97-AF65-F5344CB8AC3E}">
-        <p14:creationId xmlns:p14="http://schemas.microsoft.com/office/powerpoint/2010/main" val="2985536702"/>
+        <p14:creationId xmlns:p14="http://schemas.microsoft.com/office/powerpoint/2010/main" val="3995894110"/>
       </p:ext>
     </p:extLst>
   </p:cSld>
@@ -18279,7 +18202,7 @@
           <a:p>
             <a:r>
               <a:rPr lang="en-US" dirty="0"/>
-              <a:t>Changing a Procedure</a:t>
+              <a:t>Demo</a:t>
             </a:r>
           </a:p>
         </p:txBody>
@@ -18301,7 +18224,7 @@
           <a:p>
             <a:r>
               <a:rPr lang="en-US" dirty="0"/>
-              <a:t>Altering your API</a:t>
+              <a:t>Renames</a:t>
             </a:r>
           </a:p>
         </p:txBody>
@@ -18309,7 +18232,7 @@
     </p:spTree>
     <p:extLst>
       <p:ext uri="{BB962C8B-B14F-4D97-AF65-F5344CB8AC3E}">
-        <p14:creationId xmlns:p14="http://schemas.microsoft.com/office/powerpoint/2010/main" val="1115680825"/>
+        <p14:creationId xmlns:p14="http://schemas.microsoft.com/office/powerpoint/2010/main" val="3207381648"/>
       </p:ext>
     </p:extLst>
   </p:cSld>
@@ -18348,12 +18271,14 @@
         </p:nvSpPr>
         <p:spPr/>
         <p:txBody>
-          <a:bodyPr/>
+          <a:bodyPr>
+            <a:normAutofit fontScale="90000"/>
+          </a:bodyPr>
           <a:lstStyle/>
           <a:p>
             <a:r>
               <a:rPr lang="en-US" dirty="0"/>
-              <a:t>The Scenario</a:t>
+              <a:t>The Zero Downtime Process: Renames</a:t>
             </a:r>
           </a:p>
         </p:txBody>
@@ -18368,44 +18293,132 @@
             <p:ph idx="1"/>
           </p:nvPr>
         </p:nvSpPr>
-        <p:spPr/>
+        <p:spPr>
+          <a:xfrm>
+            <a:off x="457200" y="1123950"/>
+            <a:ext cx="8229600" cy="3394075"/>
+          </a:xfrm>
+        </p:spPr>
         <p:txBody>
           <a:bodyPr>
-            <a:normAutofit/>
+            <a:normAutofit fontScale="55000" lnSpcReduction="20000"/>
           </a:bodyPr>
           <a:lstStyle/>
           <a:p>
             <a:r>
               <a:rPr lang="en-US" dirty="0"/>
-              <a:t>There is a stored procedure in production</a:t>
-            </a:r>
-          </a:p>
-          <a:p>
+              <a:t>If possible, a quick one-step is preferred</a:t>
+            </a:r>
+          </a:p>
+          <a:p>
+            <a:pPr lvl="1"/>
             <a:r>
               <a:rPr lang="en-US" dirty="0"/>
-              <a:t>We need to add functionality</a:t>
+              <a:t>Coordination with app is hard</a:t>
             </a:r>
           </a:p>
           <a:p>
             <a:pPr lvl="1"/>
             <a:r>
               <a:rPr lang="en-US" dirty="0"/>
-              <a:t>New parameters</a:t>
+              <a:t>NOT Zero downtime usually</a:t>
+            </a:r>
+          </a:p>
+          <a:p>
+            <a:r>
+              <a:rPr lang="en-US" dirty="0"/>
+              <a:t>Use </a:t>
+            </a:r>
+            <a:r>
+              <a:rPr lang="en-US" dirty="0" err="1">
+                <a:hlinkClick r:id="rId2"/>
+              </a:rPr>
+              <a:t>sp_rename</a:t>
+            </a:r>
+            <a:r>
+              <a:rPr lang="en-US" dirty="0"/>
+              <a:t> in SQL Server/Azure/Synapse</a:t>
             </a:r>
           </a:p>
           <a:p>
             <a:pPr lvl="1"/>
             <a:r>
               <a:rPr lang="en-US" dirty="0"/>
-              <a:t>Change logic</a:t>
-            </a:r>
+              <a:t>Only if you are sure all apps can rev</a:t>
+            </a:r>
+          </a:p>
+          <a:p>
+            <a:pPr lvl="1"/>
+            <a:r>
+              <a:rPr lang="en-US" dirty="0"/>
+              <a:t>Verify this in testing</a:t>
+            </a:r>
+          </a:p>
+          <a:p>
+            <a:pPr lvl="1"/>
+            <a:r>
+              <a:rPr lang="en-US" dirty="0"/>
+              <a:t>Usually requires a deployment window so all apps can rev/toggle</a:t>
+            </a:r>
+          </a:p>
+          <a:p>
+            <a:r>
+              <a:rPr lang="en-US" dirty="0"/>
+              <a:t>Safer process is:</a:t>
+            </a:r>
+          </a:p>
+          <a:p>
+            <a:pPr lvl="1"/>
+            <a:r>
+              <a:rPr lang="en-US" dirty="0"/>
+              <a:t>Adding a new column/view</a:t>
+            </a:r>
+          </a:p>
+          <a:p>
+            <a:pPr lvl="1"/>
+            <a:r>
+              <a:rPr lang="en-US" dirty="0"/>
+              <a:t>Flip feature toggle in apps</a:t>
+            </a:r>
+          </a:p>
+          <a:p>
+            <a:pPr lvl="1"/>
+            <a:r>
+              <a:rPr lang="en-US" dirty="0"/>
+              <a:t>Use </a:t>
+            </a:r>
+            <a:r>
+              <a:rPr lang="en-US" dirty="0" err="1"/>
+              <a:t>xEvents</a:t>
+            </a:r>
+            <a:r>
+              <a:rPr lang="en-US" dirty="0"/>
+              <a:t> to check access to the old name (maybe)</a:t>
+            </a:r>
+          </a:p>
+          <a:p>
+            <a:pPr lvl="1"/>
+            <a:r>
+              <a:rPr lang="en-US" dirty="0"/>
+              <a:t>Search all code for the old name</a:t>
+            </a:r>
+          </a:p>
+          <a:p>
+            <a:pPr lvl="1"/>
+            <a:r>
+              <a:rPr lang="en-US" dirty="0"/>
+              <a:t>Drop the new col/view and rename the old one later</a:t>
+            </a:r>
+          </a:p>
+          <a:p>
+            <a:endParaRPr lang="en-US" dirty="0"/>
           </a:p>
         </p:txBody>
       </p:sp>
     </p:spTree>
     <p:extLst>
       <p:ext uri="{BB962C8B-B14F-4D97-AF65-F5344CB8AC3E}">
-        <p14:creationId xmlns:p14="http://schemas.microsoft.com/office/powerpoint/2010/main" val="1247830403"/>
+        <p14:creationId xmlns:p14="http://schemas.microsoft.com/office/powerpoint/2010/main" val="2985536702"/>
       </p:ext>
     </p:extLst>
   </p:cSld>
@@ -18460,14 +18473,14 @@
           </a:ln>
           <a:extLst>
             <a:ext uri="{909E8E84-426E-40dd-AFC4-6F175D3DCCD1}">
-              <a14:hiddenFill xmlns:a14="http://schemas.microsoft.com/office/drawing/2010/main" xmlns="">
+              <a14:hiddenFill xmlns="" xmlns:a14="http://schemas.microsoft.com/office/drawing/2010/main">
                 <a:solidFill>
                   <a:srgbClr val="FFFFFF"/>
                 </a:solidFill>
               </a14:hiddenFill>
             </a:ext>
             <a:ext uri="{91240B29-F687-4f45-9708-019B960494DF}">
-              <a14:hiddenLine xmlns:a14="http://schemas.microsoft.com/office/drawing/2010/main" xmlns="" w="9525">
+              <a14:hiddenLine xmlns="" xmlns:a14="http://schemas.microsoft.com/office/drawing/2010/main" w="9525">
                 <a:solidFill>
                   <a:srgbClr val="000000"/>
                 </a:solidFill>
@@ -20558,7 +20571,7 @@
       </p:grpSpPr>
       <p:sp>
         <p:nvSpPr>
-          <p:cNvPr id="2" name="Title 1"/>
+          <p:cNvPr id="4" name="Title 3"/>
           <p:cNvSpPr>
             <a:spLocks noGrp="1"/>
           </p:cNvSpPr>
@@ -20573,72 +20586,29 @@
           <a:p>
             <a:r>
               <a:rPr lang="en-US" dirty="0"/>
-              <a:t>The Typical Process</a:t>
-            </a:r>
-          </a:p>
-        </p:txBody>
-      </p:sp>
-      <p:sp>
-        <p:nvSpPr>
-          <p:cNvPr id="3" name="Content Placeholder 2"/>
-          <p:cNvSpPr>
-            <a:spLocks noGrp="1"/>
-          </p:cNvSpPr>
-          <p:nvPr>
-            <p:ph idx="1"/>
-          </p:nvPr>
-        </p:nvSpPr>
-        <p:spPr/>
-        <p:txBody>
-          <a:bodyPr>
-            <a:normAutofit fontScale="92500" lnSpcReduction="10000"/>
-          </a:bodyPr>
+              <a:t>Changing a Procedure</a:t>
+            </a:r>
+          </a:p>
+        </p:txBody>
+      </p:sp>
+      <p:sp>
+        <p:nvSpPr>
+          <p:cNvPr id="5" name="Text Placeholder 4"/>
+          <p:cNvSpPr>
+            <a:spLocks noGrp="1"/>
+          </p:cNvSpPr>
+          <p:nvPr>
+            <p:ph type="body" idx="1"/>
+          </p:nvPr>
+        </p:nvSpPr>
+        <p:spPr/>
+        <p:txBody>
+          <a:bodyPr/>
           <a:lstStyle/>
           <a:p>
             <a:r>
               <a:rPr lang="en-US" dirty="0"/>
-              <a:t>Update procedure code:</a:t>
-            </a:r>
-          </a:p>
-          <a:p>
-            <a:pPr lvl="1"/>
-            <a:r>
-              <a:rPr lang="en-US" dirty="0"/>
-              <a:t>Add new parameters</a:t>
-            </a:r>
-          </a:p>
-          <a:p>
-            <a:pPr lvl="1"/>
-            <a:r>
-              <a:rPr lang="en-US" dirty="0"/>
-              <a:t>Remove old parameters</a:t>
-            </a:r>
-          </a:p>
-          <a:p>
-            <a:pPr lvl="1"/>
-            <a:r>
-              <a:rPr lang="en-US" dirty="0"/>
-              <a:t>Update proc logic</a:t>
-            </a:r>
-          </a:p>
-          <a:p>
-            <a:r>
-              <a:rPr lang="en-US" dirty="0"/>
-              <a:t>Challenges</a:t>
-            </a:r>
-          </a:p>
-          <a:p>
-            <a:pPr lvl="1"/>
-            <a:r>
-              <a:rPr lang="en-US" dirty="0"/>
-              <a:t>Updating all app calls</a:t>
-            </a:r>
-          </a:p>
-          <a:p>
-            <a:pPr lvl="1"/>
-            <a:r>
-              <a:rPr lang="en-US" dirty="0"/>
-              <a:t>Syncing with application deployment</a:t>
+              <a:t>Altering your API</a:t>
             </a:r>
           </a:p>
         </p:txBody>
@@ -20646,7 +20616,7 @@
     </p:spTree>
     <p:extLst>
       <p:ext uri="{BB962C8B-B14F-4D97-AF65-F5344CB8AC3E}">
-        <p14:creationId xmlns:p14="http://schemas.microsoft.com/office/powerpoint/2010/main" val="1499344226"/>
+        <p14:creationId xmlns:p14="http://schemas.microsoft.com/office/powerpoint/2010/main" val="1115680825"/>
       </p:ext>
     </p:extLst>
   </p:cSld>
@@ -20675,7 +20645,7 @@
       </p:grpSpPr>
       <p:sp>
         <p:nvSpPr>
-          <p:cNvPr id="4" name="Title 3"/>
+          <p:cNvPr id="2" name="Title 1"/>
           <p:cNvSpPr>
             <a:spLocks noGrp="1"/>
           </p:cNvSpPr>
@@ -20690,29 +20660,51 @@
           <a:p>
             <a:r>
               <a:rPr lang="en-US" dirty="0"/>
-              <a:t>Demo</a:t>
-            </a:r>
-          </a:p>
-        </p:txBody>
-      </p:sp>
-      <p:sp>
-        <p:nvSpPr>
-          <p:cNvPr id="5" name="Text Placeholder 4"/>
-          <p:cNvSpPr>
-            <a:spLocks noGrp="1"/>
-          </p:cNvSpPr>
-          <p:nvPr>
-            <p:ph type="body" idx="1"/>
-          </p:nvPr>
-        </p:nvSpPr>
-        <p:spPr/>
-        <p:txBody>
-          <a:bodyPr/>
+              <a:t>The Scenario</a:t>
+            </a:r>
+          </a:p>
+        </p:txBody>
+      </p:sp>
+      <p:sp>
+        <p:nvSpPr>
+          <p:cNvPr id="3" name="Content Placeholder 2"/>
+          <p:cNvSpPr>
+            <a:spLocks noGrp="1"/>
+          </p:cNvSpPr>
+          <p:nvPr>
+            <p:ph idx="1"/>
+          </p:nvPr>
+        </p:nvSpPr>
+        <p:spPr/>
+        <p:txBody>
+          <a:bodyPr>
+            <a:normAutofit/>
+          </a:bodyPr>
           <a:lstStyle/>
           <a:p>
             <a:r>
               <a:rPr lang="en-US" dirty="0"/>
-              <a:t>Enhancing a Stored Procedure</a:t>
+              <a:t>There is a stored procedure in production</a:t>
+            </a:r>
+          </a:p>
+          <a:p>
+            <a:r>
+              <a:rPr lang="en-US" dirty="0"/>
+              <a:t>We need to add functionality</a:t>
+            </a:r>
+          </a:p>
+          <a:p>
+            <a:pPr lvl="1"/>
+            <a:r>
+              <a:rPr lang="en-US" dirty="0"/>
+              <a:t>New parameters</a:t>
+            </a:r>
+          </a:p>
+          <a:p>
+            <a:pPr lvl="1"/>
+            <a:r>
+              <a:rPr lang="en-US" dirty="0"/>
+              <a:t>Change logic</a:t>
             </a:r>
           </a:p>
         </p:txBody>
@@ -20720,7 +20712,7 @@
     </p:spTree>
     <p:extLst>
       <p:ext uri="{BB962C8B-B14F-4D97-AF65-F5344CB8AC3E}">
-        <p14:creationId xmlns:p14="http://schemas.microsoft.com/office/powerpoint/2010/main" val="2902055363"/>
+        <p14:creationId xmlns:p14="http://schemas.microsoft.com/office/powerpoint/2010/main" val="1247830403"/>
       </p:ext>
     </p:extLst>
   </p:cSld>
@@ -20759,14 +20751,12 @@
         </p:nvSpPr>
         <p:spPr/>
         <p:txBody>
-          <a:bodyPr>
-            <a:normAutofit/>
-          </a:bodyPr>
+          <a:bodyPr/>
           <a:lstStyle/>
           <a:p>
             <a:r>
               <a:rPr lang="en-US" dirty="0"/>
-              <a:t>The Zero Downtime Process</a:t>
+              <a:t>The Typical Process</a:t>
             </a:r>
           </a:p>
         </p:txBody>
@@ -20789,90 +20779,49 @@
           <a:lstStyle/>
           <a:p>
             <a:r>
-              <a:rPr lang="en-US" sz="2000" dirty="0"/>
-              <a:t>Add parameters in one deployment, remove in another</a:t>
-            </a:r>
-          </a:p>
-          <a:p>
-            <a:r>
-              <a:rPr lang="en-US" sz="2000" dirty="0"/>
-              <a:t>Use defaults so old code works</a:t>
+              <a:rPr lang="en-US" dirty="0"/>
+              <a:t>Update procedure code:</a:t>
             </a:r>
           </a:p>
           <a:p>
             <a:pPr lvl="1"/>
             <a:r>
-              <a:rPr lang="en-US" sz="1600" dirty="0"/>
-              <a:t>Prefer old</a:t>
+              <a:rPr lang="en-US" dirty="0"/>
+              <a:t>Add new parameters</a:t>
             </a:r>
           </a:p>
           <a:p>
             <a:pPr lvl="1"/>
             <a:r>
-              <a:rPr lang="en-US" sz="1600" dirty="0"/>
-              <a:t>Prefer new</a:t>
+              <a:rPr lang="en-US" dirty="0"/>
+              <a:t>Remove old parameters</a:t>
             </a:r>
           </a:p>
           <a:p>
             <a:pPr lvl="1"/>
             <a:r>
-              <a:rPr lang="en-US" sz="1600" dirty="0"/>
-              <a:t>New only</a:t>
-            </a:r>
-          </a:p>
-          <a:p>
-            <a:r>
-              <a:rPr lang="en-US" sz="2000" dirty="0"/>
-              <a:t>Verify logical functionality with/without default parameter</a:t>
+              <a:rPr lang="en-US" dirty="0"/>
+              <a:t>Update proc logic</a:t>
+            </a:r>
+          </a:p>
+          <a:p>
+            <a:r>
+              <a:rPr lang="en-US" dirty="0"/>
+              <a:t>Challenges</a:t>
             </a:r>
           </a:p>
           <a:p>
             <a:pPr lvl="1"/>
             <a:r>
-              <a:rPr lang="en-US" sz="1600" dirty="0"/>
-              <a:t>Without, must return same results are before the deployment</a:t>
+              <a:rPr lang="en-US" dirty="0"/>
+              <a:t>Updating all app calls</a:t>
             </a:r>
           </a:p>
           <a:p>
             <a:pPr lvl="1"/>
             <a:r>
-              <a:rPr lang="en-US" sz="1600" dirty="0"/>
-              <a:t>Use switching logic inside if necessary</a:t>
-            </a:r>
-          </a:p>
-          <a:p>
-            <a:pPr lvl="1"/>
-            <a:r>
-              <a:rPr lang="en-US" sz="1600" dirty="0"/>
-              <a:t>Write tests!!!!</a:t>
-            </a:r>
-          </a:p>
-          <a:p>
-            <a:r>
-              <a:rPr lang="en-US" sz="2000" dirty="0"/>
-              <a:t>Log the calls without a parameter somewhere</a:t>
-            </a:r>
-          </a:p>
-          <a:p>
-            <a:pPr lvl="1"/>
-            <a:r>
-              <a:rPr lang="en-US" sz="1600" dirty="0"/>
-              <a:t>This helps to determine when all clients have </a:t>
-            </a:r>
-            <a:r>
-              <a:rPr lang="en-US" sz="1600" dirty="0" err="1"/>
-              <a:t>rev’d</a:t>
-            </a:r>
-            <a:r>
-              <a:rPr lang="en-US" sz="1600" dirty="0"/>
-              <a:t>.</a:t>
-            </a:r>
-          </a:p>
-          <a:p>
-            <a:pPr lvl="1"/>
-            <a:r>
-              <a:rPr lang="en-US" sz="1600" dirty="0"/>
-              <a:t>Provide feedback to app teams</a:t>
+              <a:rPr lang="en-US" dirty="0"/>
+              <a:t>Syncing with application deployment</a:t>
             </a:r>
           </a:p>
         </p:txBody>
@@ -20880,7 +20829,7 @@
     </p:spTree>
     <p:extLst>
       <p:ext uri="{BB962C8B-B14F-4D97-AF65-F5344CB8AC3E}">
-        <p14:creationId xmlns:p14="http://schemas.microsoft.com/office/powerpoint/2010/main" val="2331837434"/>
+        <p14:creationId xmlns:p14="http://schemas.microsoft.com/office/powerpoint/2010/main" val="1499344226"/>
       </p:ext>
     </p:extLst>
   </p:cSld>
@@ -20924,7 +20873,7 @@
           <a:p>
             <a:r>
               <a:rPr lang="en-US" dirty="0"/>
-              <a:t>Best Practices</a:t>
+              <a:t>Demo</a:t>
             </a:r>
           </a:p>
         </p:txBody>
@@ -20946,7 +20895,7 @@
           <a:p>
             <a:r>
               <a:rPr lang="en-US" dirty="0"/>
-              <a:t>The things that work well</a:t>
+              <a:t>Enhancing a Stored Procedure</a:t>
             </a:r>
           </a:p>
         </p:txBody>
@@ -20954,7 +20903,7 @@
     </p:spTree>
     <p:extLst>
       <p:ext uri="{BB962C8B-B14F-4D97-AF65-F5344CB8AC3E}">
-        <p14:creationId xmlns:p14="http://schemas.microsoft.com/office/powerpoint/2010/main" val="2145363350"/>
+        <p14:creationId xmlns:p14="http://schemas.microsoft.com/office/powerpoint/2010/main" val="2902055363"/>
       </p:ext>
     </p:extLst>
   </p:cSld>
@@ -20993,12 +20942,14 @@
         </p:nvSpPr>
         <p:spPr/>
         <p:txBody>
-          <a:bodyPr/>
+          <a:bodyPr>
+            <a:normAutofit/>
+          </a:bodyPr>
           <a:lstStyle/>
           <a:p>
             <a:r>
               <a:rPr lang="en-US" dirty="0"/>
-              <a:t>Best Practices for Applications</a:t>
+              <a:t>The Zero Downtime Process</a:t>
             </a:r>
           </a:p>
         </p:txBody>
@@ -21016,71 +20967,95 @@
         <p:spPr/>
         <p:txBody>
           <a:bodyPr>
-            <a:normAutofit fontScale="70000" lnSpcReduction="20000"/>
+            <a:normAutofit fontScale="92500" lnSpcReduction="10000"/>
           </a:bodyPr>
           <a:lstStyle/>
           <a:p>
             <a:r>
-              <a:rPr lang="en-US" dirty="0"/>
-              <a:t>Use Feature Toggles</a:t>
-            </a:r>
-          </a:p>
-          <a:p>
-            <a:r>
-              <a:rPr lang="en-US" dirty="0"/>
-              <a:t>Use column names</a:t>
+              <a:rPr lang="en-US" sz="2000" dirty="0"/>
+              <a:t>Add parameters in one deployment, remove in another</a:t>
+            </a:r>
+          </a:p>
+          <a:p>
+            <a:r>
+              <a:rPr lang="en-US" sz="2000" dirty="0"/>
+              <a:t>Use defaults so old code works</a:t>
             </a:r>
           </a:p>
           <a:p>
             <a:pPr lvl="1"/>
             <a:r>
-              <a:rPr lang="en-US" dirty="0"/>
-              <a:t>Result sets</a:t>
+              <a:rPr lang="en-US" sz="1600" dirty="0"/>
+              <a:t>Prefer old</a:t>
             </a:r>
           </a:p>
           <a:p>
             <a:pPr lvl="1"/>
             <a:r>
-              <a:rPr lang="en-US" dirty="0"/>
-              <a:t>SQL code</a:t>
+              <a:rPr lang="en-US" sz="1600" dirty="0"/>
+              <a:t>Prefer new</a:t>
             </a:r>
           </a:p>
           <a:p>
             <a:pPr lvl="1"/>
             <a:r>
-              <a:rPr lang="en-US" dirty="0"/>
-              <a:t>No numbers for columns</a:t>
-            </a:r>
-          </a:p>
-          <a:p>
-            <a:r>
-              <a:rPr lang="en-US" dirty="0"/>
-              <a:t>Ensure INSERTs use column lists</a:t>
-            </a:r>
-          </a:p>
-          <a:p>
-            <a:r>
-              <a:rPr lang="en-US" dirty="0"/>
-              <a:t>Parameterize stored procedures and functions</a:t>
+              <a:rPr lang="en-US" sz="1600" dirty="0"/>
+              <a:t>New only</a:t>
+            </a:r>
+          </a:p>
+          <a:p>
+            <a:r>
+              <a:rPr lang="en-US" sz="2000" dirty="0"/>
+              <a:t>Verify logical functionality with/without default parameter</a:t>
             </a:r>
           </a:p>
           <a:p>
             <a:pPr lvl="1"/>
             <a:r>
-              <a:rPr lang="en-US" dirty="0"/>
-              <a:t>Or use named parameters in calls</a:t>
-            </a:r>
-          </a:p>
-          <a:p>
-            <a:r>
-              <a:rPr lang="en-US" dirty="0"/>
-              <a:t>No SELECT *</a:t>
-            </a:r>
-          </a:p>
-          <a:p>
-            <a:r>
-              <a:rPr lang="en-US" dirty="0"/>
-              <a:t>Use good error handling and log db errors for quick resolution</a:t>
+              <a:rPr lang="en-US" sz="1600" dirty="0"/>
+              <a:t>Without, must return same results are before the deployment</a:t>
+            </a:r>
+          </a:p>
+          <a:p>
+            <a:pPr lvl="1"/>
+            <a:r>
+              <a:rPr lang="en-US" sz="1600" dirty="0"/>
+              <a:t>Use switching logic inside if necessary</a:t>
+            </a:r>
+          </a:p>
+          <a:p>
+            <a:pPr lvl="1"/>
+            <a:r>
+              <a:rPr lang="en-US" sz="1600" dirty="0"/>
+              <a:t>Write tests!!!!</a:t>
+            </a:r>
+          </a:p>
+          <a:p>
+            <a:r>
+              <a:rPr lang="en-US" sz="2000" dirty="0"/>
+              <a:t>Log the calls without a parameter somewhere</a:t>
+            </a:r>
+          </a:p>
+          <a:p>
+            <a:pPr lvl="1"/>
+            <a:r>
+              <a:rPr lang="en-US" sz="1600" dirty="0"/>
+              <a:t>This helps to determine when all clients have </a:t>
+            </a:r>
+            <a:r>
+              <a:rPr lang="en-US" sz="1600" dirty="0" err="1"/>
+              <a:t>rev’d</a:t>
+            </a:r>
+            <a:r>
+              <a:rPr lang="en-US" sz="1600" dirty="0"/>
+              <a:t>.</a:t>
+            </a:r>
+          </a:p>
+          <a:p>
+            <a:pPr lvl="1"/>
+            <a:r>
+              <a:rPr lang="en-US" sz="1600" dirty="0"/>
+              <a:t>Provide feedback to app teams</a:t>
             </a:r>
           </a:p>
         </p:txBody>
@@ -21088,7 +21063,7 @@
     </p:spTree>
     <p:extLst>
       <p:ext uri="{BB962C8B-B14F-4D97-AF65-F5344CB8AC3E}">
-        <p14:creationId xmlns:p14="http://schemas.microsoft.com/office/powerpoint/2010/main" val="3066122781"/>
+        <p14:creationId xmlns:p14="http://schemas.microsoft.com/office/powerpoint/2010/main" val="2331837434"/>
       </p:ext>
     </p:extLst>
   </p:cSld>
@@ -21117,7 +21092,7 @@
       </p:grpSpPr>
       <p:sp>
         <p:nvSpPr>
-          <p:cNvPr id="2" name="Title 1"/>
+          <p:cNvPr id="4" name="Title 3"/>
           <p:cNvSpPr>
             <a:spLocks noGrp="1"/>
           </p:cNvSpPr>
@@ -21132,87 +21107,29 @@
           <a:p>
             <a:r>
               <a:rPr lang="en-US" dirty="0"/>
-              <a:t>Best Practices for Database Code</a:t>
-            </a:r>
-          </a:p>
-        </p:txBody>
-      </p:sp>
-      <p:sp>
-        <p:nvSpPr>
-          <p:cNvPr id="3" name="Content Placeholder 2"/>
-          <p:cNvSpPr>
-            <a:spLocks noGrp="1"/>
-          </p:cNvSpPr>
-          <p:nvPr>
-            <p:ph idx="1"/>
-          </p:nvPr>
-        </p:nvSpPr>
-        <p:spPr/>
-        <p:txBody>
-          <a:bodyPr>
-            <a:normAutofit fontScale="70000" lnSpcReduction="20000"/>
-          </a:bodyPr>
+              <a:t>Best Practices</a:t>
+            </a:r>
+          </a:p>
+        </p:txBody>
+      </p:sp>
+      <p:sp>
+        <p:nvSpPr>
+          <p:cNvPr id="5" name="Text Placeholder 4"/>
+          <p:cNvSpPr>
+            <a:spLocks noGrp="1"/>
+          </p:cNvSpPr>
+          <p:nvPr>
+            <p:ph type="body" idx="1"/>
+          </p:nvPr>
+        </p:nvSpPr>
+        <p:spPr/>
+        <p:txBody>
+          <a:bodyPr/>
           <a:lstStyle/>
           <a:p>
             <a:r>
               <a:rPr lang="en-US" dirty="0"/>
-              <a:t>Break deployments up into stages</a:t>
-            </a:r>
-          </a:p>
-          <a:p>
-            <a:r>
-              <a:rPr lang="en-US" dirty="0"/>
-              <a:t>Use defaults wherever possible</a:t>
-            </a:r>
-          </a:p>
-          <a:p>
-            <a:r>
-              <a:rPr lang="en-US" dirty="0"/>
-              <a:t>No SELECT * in code (views/procs/functions)</a:t>
-            </a:r>
-          </a:p>
-          <a:p>
-            <a:r>
-              <a:rPr lang="en-US" dirty="0"/>
-              <a:t>Use INSERT column lists (no INSERT..SELECT)</a:t>
-            </a:r>
-          </a:p>
-          <a:p>
-            <a:r>
-              <a:rPr lang="en-US" dirty="0"/>
-              <a:t>Only add parameters in procs </a:t>
-            </a:r>
-          </a:p>
-          <a:p>
-            <a:pPr lvl="1"/>
-            <a:r>
-              <a:rPr lang="en-US" dirty="0"/>
-              <a:t>Use defaults</a:t>
-            </a:r>
-          </a:p>
-          <a:p>
-            <a:pPr lvl="1"/>
-            <a:r>
-              <a:rPr lang="en-US" dirty="0"/>
-              <a:t>Removal is a separate deployment</a:t>
-            </a:r>
-          </a:p>
-          <a:p>
-            <a:r>
-              <a:rPr lang="en-US" dirty="0"/>
-              <a:t>Use parameter names in calls</a:t>
-            </a:r>
-          </a:p>
-          <a:p>
-            <a:r>
-              <a:rPr lang="en-US" dirty="0"/>
-              <a:t>Avoid renames (aliases, synonyms, views can help here)</a:t>
-            </a:r>
-          </a:p>
-          <a:p>
-            <a:r>
-              <a:rPr lang="en-US" dirty="0"/>
-              <a:t>Order of columns DOESN’T MATTER</a:t>
+              <a:t>The things that work well</a:t>
             </a:r>
           </a:p>
         </p:txBody>
@@ -21220,7 +21137,7 @@
     </p:spTree>
     <p:extLst>
       <p:ext uri="{BB962C8B-B14F-4D97-AF65-F5344CB8AC3E}">
-        <p14:creationId xmlns:p14="http://schemas.microsoft.com/office/powerpoint/2010/main" val="133129104"/>
+        <p14:creationId xmlns:p14="http://schemas.microsoft.com/office/powerpoint/2010/main" val="2145363350"/>
       </p:ext>
     </p:extLst>
   </p:cSld>
@@ -21264,7 +21181,7 @@
           <a:p>
             <a:r>
               <a:rPr lang="en-US" dirty="0"/>
-              <a:t>Best Practices for Deployments</a:t>
+              <a:t>Best Practices for Applications</a:t>
             </a:r>
           </a:p>
         </p:txBody>
@@ -21282,47 +21199,71 @@
         <p:spPr/>
         <p:txBody>
           <a:bodyPr>
-            <a:normAutofit fontScale="85000" lnSpcReduction="10000"/>
+            <a:normAutofit fontScale="70000" lnSpcReduction="20000"/>
           </a:bodyPr>
           <a:lstStyle/>
           <a:p>
             <a:r>
               <a:rPr lang="en-US" dirty="0"/>
-              <a:t>Never add and drop in the same deployment (for related objects)</a:t>
+              <a:t>Use Feature Toggles</a:t>
             </a:r>
           </a:p>
           <a:p>
             <a:r>
               <a:rPr lang="en-US" dirty="0"/>
-              <a:t>Trade space for time, keeping copies of data for a period</a:t>
-            </a:r>
-          </a:p>
-          <a:p>
+              <a:t>Use column names</a:t>
+            </a:r>
+          </a:p>
+          <a:p>
+            <a:pPr lvl="1"/>
             <a:r>
               <a:rPr lang="en-US" dirty="0"/>
-              <a:t>Write the cleanup code with the enhancement code</a:t>
+              <a:t>Result sets</a:t>
             </a:r>
           </a:p>
           <a:p>
             <a:pPr lvl="1"/>
             <a:r>
               <a:rPr lang="en-US" dirty="0"/>
-              <a:t>Test this together with the enhancement</a:t>
+              <a:t>SQL code</a:t>
             </a:r>
           </a:p>
           <a:p>
             <a:pPr lvl="1"/>
             <a:r>
               <a:rPr lang="en-US" dirty="0"/>
-              <a:t>Make a </a:t>
-            </a:r>
-            <a:r>
-              <a:rPr lang="en-US"/>
-              <a:t>separate branch/PR </a:t>
-            </a:r>
+              <a:t>No numbers for columns</a:t>
+            </a:r>
+          </a:p>
+          <a:p>
             <a:r>
               <a:rPr lang="en-US" dirty="0"/>
-              <a:t>with a FUTURE DATE for deployment</a:t>
+              <a:t>Ensure INSERTs use column lists</a:t>
+            </a:r>
+          </a:p>
+          <a:p>
+            <a:r>
+              <a:rPr lang="en-US" dirty="0"/>
+              <a:t>Parameterize stored procedures and functions</a:t>
+            </a:r>
+          </a:p>
+          <a:p>
+            <a:pPr lvl="1"/>
+            <a:r>
+              <a:rPr lang="en-US" dirty="0"/>
+              <a:t>Or use named parameters in calls</a:t>
+            </a:r>
+          </a:p>
+          <a:p>
+            <a:r>
+              <a:rPr lang="en-US" dirty="0"/>
+              <a:t>No SELECT *</a:t>
+            </a:r>
+          </a:p>
+          <a:p>
+            <a:r>
+              <a:rPr lang="en-US" dirty="0"/>
+              <a:t>Use good error handling and log db errors for quick resolution</a:t>
             </a:r>
           </a:p>
         </p:txBody>
@@ -21330,7 +21271,7 @@
     </p:spTree>
     <p:extLst>
       <p:ext uri="{BB962C8B-B14F-4D97-AF65-F5344CB8AC3E}">
-        <p14:creationId xmlns:p14="http://schemas.microsoft.com/office/powerpoint/2010/main" val="3776532649"/>
+        <p14:creationId xmlns:p14="http://schemas.microsoft.com/office/powerpoint/2010/main" val="3066122781"/>
       </p:ext>
     </p:extLst>
   </p:cSld>
@@ -21374,6 +21315,248 @@
           <a:p>
             <a:r>
               <a:rPr lang="en-US" dirty="0"/>
+              <a:t>Best Practices for Database Code</a:t>
+            </a:r>
+          </a:p>
+        </p:txBody>
+      </p:sp>
+      <p:sp>
+        <p:nvSpPr>
+          <p:cNvPr id="3" name="Content Placeholder 2"/>
+          <p:cNvSpPr>
+            <a:spLocks noGrp="1"/>
+          </p:cNvSpPr>
+          <p:nvPr>
+            <p:ph idx="1"/>
+          </p:nvPr>
+        </p:nvSpPr>
+        <p:spPr/>
+        <p:txBody>
+          <a:bodyPr>
+            <a:normAutofit fontScale="70000" lnSpcReduction="20000"/>
+          </a:bodyPr>
+          <a:lstStyle/>
+          <a:p>
+            <a:r>
+              <a:rPr lang="en-US" dirty="0"/>
+              <a:t>Break deployments up into stages</a:t>
+            </a:r>
+          </a:p>
+          <a:p>
+            <a:r>
+              <a:rPr lang="en-US" dirty="0"/>
+              <a:t>Use defaults wherever possible</a:t>
+            </a:r>
+          </a:p>
+          <a:p>
+            <a:r>
+              <a:rPr lang="en-US" dirty="0"/>
+              <a:t>No SELECT * in code (views/procs/functions)</a:t>
+            </a:r>
+          </a:p>
+          <a:p>
+            <a:r>
+              <a:rPr lang="en-US" dirty="0"/>
+              <a:t>Use INSERT column lists (no INSERT..SELECT)</a:t>
+            </a:r>
+          </a:p>
+          <a:p>
+            <a:r>
+              <a:rPr lang="en-US" dirty="0"/>
+              <a:t>Only add parameters in procs </a:t>
+            </a:r>
+          </a:p>
+          <a:p>
+            <a:pPr lvl="1"/>
+            <a:r>
+              <a:rPr lang="en-US" dirty="0"/>
+              <a:t>Use defaults</a:t>
+            </a:r>
+          </a:p>
+          <a:p>
+            <a:pPr lvl="1"/>
+            <a:r>
+              <a:rPr lang="en-US" dirty="0"/>
+              <a:t>Removal is a separate deployment</a:t>
+            </a:r>
+          </a:p>
+          <a:p>
+            <a:r>
+              <a:rPr lang="en-US" dirty="0"/>
+              <a:t>Use parameter names in calls</a:t>
+            </a:r>
+          </a:p>
+          <a:p>
+            <a:r>
+              <a:rPr lang="en-US" dirty="0"/>
+              <a:t>Avoid renames (aliases, synonyms, views can help here)</a:t>
+            </a:r>
+          </a:p>
+          <a:p>
+            <a:r>
+              <a:rPr lang="en-US" dirty="0"/>
+              <a:t>Order of columns DOESN’T MATTER</a:t>
+            </a:r>
+          </a:p>
+        </p:txBody>
+      </p:sp>
+    </p:spTree>
+    <p:extLst>
+      <p:ext uri="{BB962C8B-B14F-4D97-AF65-F5344CB8AC3E}">
+        <p14:creationId xmlns:p14="http://schemas.microsoft.com/office/powerpoint/2010/main" val="133129104"/>
+      </p:ext>
+    </p:extLst>
+  </p:cSld>
+  <p:clrMapOvr>
+    <a:masterClrMapping/>
+  </p:clrMapOvr>
+</p:sld>
+</file>
+
+<file path=ppt/slides/slide38.xml><?xml version="1.0" encoding="utf-8"?>
+<p:sld xmlns:a="http://schemas.openxmlformats.org/drawingml/2006/main" xmlns:r="http://schemas.openxmlformats.org/officeDocument/2006/relationships" xmlns:p="http://schemas.openxmlformats.org/presentationml/2006/main">
+  <p:cSld>
+    <p:spTree>
+      <p:nvGrpSpPr>
+        <p:cNvPr id="1" name=""/>
+        <p:cNvGrpSpPr/>
+        <p:nvPr/>
+      </p:nvGrpSpPr>
+      <p:grpSpPr>
+        <a:xfrm>
+          <a:off x="0" y="0"/>
+          <a:ext cx="0" cy="0"/>
+          <a:chOff x="0" y="0"/>
+          <a:chExt cx="0" cy="0"/>
+        </a:xfrm>
+      </p:grpSpPr>
+      <p:sp>
+        <p:nvSpPr>
+          <p:cNvPr id="2" name="Title 1"/>
+          <p:cNvSpPr>
+            <a:spLocks noGrp="1"/>
+          </p:cNvSpPr>
+          <p:nvPr>
+            <p:ph type="title"/>
+          </p:nvPr>
+        </p:nvSpPr>
+        <p:spPr/>
+        <p:txBody>
+          <a:bodyPr/>
+          <a:lstStyle/>
+          <a:p>
+            <a:r>
+              <a:rPr lang="en-US" dirty="0"/>
+              <a:t>Best Practices for Deployments</a:t>
+            </a:r>
+          </a:p>
+        </p:txBody>
+      </p:sp>
+      <p:sp>
+        <p:nvSpPr>
+          <p:cNvPr id="3" name="Content Placeholder 2"/>
+          <p:cNvSpPr>
+            <a:spLocks noGrp="1"/>
+          </p:cNvSpPr>
+          <p:nvPr>
+            <p:ph idx="1"/>
+          </p:nvPr>
+        </p:nvSpPr>
+        <p:spPr/>
+        <p:txBody>
+          <a:bodyPr>
+            <a:normAutofit fontScale="85000" lnSpcReduction="10000"/>
+          </a:bodyPr>
+          <a:lstStyle/>
+          <a:p>
+            <a:r>
+              <a:rPr lang="en-US" dirty="0"/>
+              <a:t>Never add and drop in the same deployment (for related objects)</a:t>
+            </a:r>
+          </a:p>
+          <a:p>
+            <a:r>
+              <a:rPr lang="en-US" dirty="0"/>
+              <a:t>Trade space for time, keeping copies of data for a period</a:t>
+            </a:r>
+          </a:p>
+          <a:p>
+            <a:r>
+              <a:rPr lang="en-US" dirty="0"/>
+              <a:t>Write the cleanup code with the enhancement code</a:t>
+            </a:r>
+          </a:p>
+          <a:p>
+            <a:pPr lvl="1"/>
+            <a:r>
+              <a:rPr lang="en-US" dirty="0"/>
+              <a:t>Test this together with the enhancement</a:t>
+            </a:r>
+          </a:p>
+          <a:p>
+            <a:pPr lvl="1"/>
+            <a:r>
+              <a:rPr lang="en-US" dirty="0"/>
+              <a:t>Make a </a:t>
+            </a:r>
+            <a:r>
+              <a:rPr lang="en-US"/>
+              <a:t>separate branch/PR </a:t>
+            </a:r>
+            <a:r>
+              <a:rPr lang="en-US" dirty="0"/>
+              <a:t>with a FUTURE DATE for deployment</a:t>
+            </a:r>
+          </a:p>
+        </p:txBody>
+      </p:sp>
+    </p:spTree>
+    <p:extLst>
+      <p:ext uri="{BB962C8B-B14F-4D97-AF65-F5344CB8AC3E}">
+        <p14:creationId xmlns:p14="http://schemas.microsoft.com/office/powerpoint/2010/main" val="3776532649"/>
+      </p:ext>
+    </p:extLst>
+  </p:cSld>
+  <p:clrMapOvr>
+    <a:masterClrMapping/>
+  </p:clrMapOvr>
+</p:sld>
+</file>
+
+<file path=ppt/slides/slide39.xml><?xml version="1.0" encoding="utf-8"?>
+<p:sld xmlns:a="http://schemas.openxmlformats.org/drawingml/2006/main" xmlns:r="http://schemas.openxmlformats.org/officeDocument/2006/relationships" xmlns:p="http://schemas.openxmlformats.org/presentationml/2006/main">
+  <p:cSld>
+    <p:spTree>
+      <p:nvGrpSpPr>
+        <p:cNvPr id="1" name=""/>
+        <p:cNvGrpSpPr/>
+        <p:nvPr/>
+      </p:nvGrpSpPr>
+      <p:grpSpPr>
+        <a:xfrm>
+          <a:off x="0" y="0"/>
+          <a:ext cx="0" cy="0"/>
+          <a:chOff x="0" y="0"/>
+          <a:chExt cx="0" cy="0"/>
+        </a:xfrm>
+      </p:grpSpPr>
+      <p:sp>
+        <p:nvSpPr>
+          <p:cNvPr id="2" name="Title 1"/>
+          <p:cNvSpPr>
+            <a:spLocks noGrp="1"/>
+          </p:cNvSpPr>
+          <p:nvPr>
+            <p:ph type="title"/>
+          </p:nvPr>
+        </p:nvSpPr>
+        <p:spPr/>
+        <p:txBody>
+          <a:bodyPr/>
+          <a:lstStyle/>
+          <a:p>
+            <a:r>
+              <a:rPr lang="en-US" dirty="0"/>
               <a:t>Summary</a:t>
             </a:r>
           </a:p>
@@ -21446,7 +21629,61 @@
 </p:sld>
 </file>
 
-<file path=ppt/slides/slide38.xml><?xml version="1.0" encoding="utf-8"?>
+<file path=ppt/slides/slide4.xml><?xml version="1.0" encoding="utf-8"?>
+<p:sld xmlns:a="http://schemas.openxmlformats.org/drawingml/2006/main" xmlns:r="http://schemas.openxmlformats.org/officeDocument/2006/relationships" xmlns:p="http://schemas.openxmlformats.org/presentationml/2006/main">
+  <p:cSld>
+    <p:spTree>
+      <p:nvGrpSpPr>
+        <p:cNvPr id="1" name=""/>
+        <p:cNvGrpSpPr/>
+        <p:nvPr/>
+      </p:nvGrpSpPr>
+      <p:grpSpPr>
+        <a:xfrm>
+          <a:off x="0" y="0"/>
+          <a:ext cx="0" cy="0"/>
+          <a:chOff x="0" y="0"/>
+          <a:chExt cx="0" cy="0"/>
+        </a:xfrm>
+      </p:grpSpPr>
+      <p:sp>
+        <p:nvSpPr>
+          <p:cNvPr id="4" name="Title 3"/>
+          <p:cNvSpPr>
+            <a:spLocks noGrp="1"/>
+          </p:cNvSpPr>
+          <p:nvPr>
+            <p:ph type="title"/>
+          </p:nvPr>
+        </p:nvSpPr>
+        <p:spPr/>
+        <p:txBody>
+          <a:bodyPr>
+            <a:normAutofit fontScale="90000"/>
+          </a:bodyPr>
+          <a:lstStyle/>
+          <a:p>
+            <a:r>
+              <a:rPr lang="en-US" dirty="0"/>
+              <a:t>Defining Zero Downtime for Databases</a:t>
+            </a:r>
+          </a:p>
+        </p:txBody>
+      </p:sp>
+    </p:spTree>
+    <p:extLst>
+      <p:ext uri="{BB962C8B-B14F-4D97-AF65-F5344CB8AC3E}">
+        <p14:creationId xmlns:p14="http://schemas.microsoft.com/office/powerpoint/2010/main" val="1631803677"/>
+      </p:ext>
+    </p:extLst>
+  </p:cSld>
+  <p:clrMapOvr>
+    <a:masterClrMapping/>
+  </p:clrMapOvr>
+</p:sld>
+</file>
+
+<file path=ppt/slides/slide40.xml><?xml version="1.0" encoding="utf-8"?>
 <p:sld xmlns:a="http://schemas.openxmlformats.org/drawingml/2006/main" xmlns:r="http://schemas.openxmlformats.org/officeDocument/2006/relationships" xmlns:p="http://schemas.openxmlformats.org/presentationml/2006/main">
   <p:cSld>
     <p:spTree>
@@ -21988,7 +22225,7 @@
 </p:sld>
 </file>
 
-<file path=ppt/slides/slide39.xml><?xml version="1.0" encoding="utf-8"?>
+<file path=ppt/slides/slide41.xml><?xml version="1.0" encoding="utf-8"?>
 <p:sld xmlns:a="http://schemas.openxmlformats.org/drawingml/2006/main" xmlns:r="http://schemas.openxmlformats.org/officeDocument/2006/relationships" xmlns:p="http://schemas.openxmlformats.org/presentationml/2006/main" show="0">
   <p:cSld>
     <p:spTree>
@@ -22553,61 +22790,7 @@
 </p:sld>
 </file>
 
-<file path=ppt/slides/slide4.xml><?xml version="1.0" encoding="utf-8"?>
-<p:sld xmlns:a="http://schemas.openxmlformats.org/drawingml/2006/main" xmlns:r="http://schemas.openxmlformats.org/officeDocument/2006/relationships" xmlns:p="http://schemas.openxmlformats.org/presentationml/2006/main">
-  <p:cSld>
-    <p:spTree>
-      <p:nvGrpSpPr>
-        <p:cNvPr id="1" name=""/>
-        <p:cNvGrpSpPr/>
-        <p:nvPr/>
-      </p:nvGrpSpPr>
-      <p:grpSpPr>
-        <a:xfrm>
-          <a:off x="0" y="0"/>
-          <a:ext cx="0" cy="0"/>
-          <a:chOff x="0" y="0"/>
-          <a:chExt cx="0" cy="0"/>
-        </a:xfrm>
-      </p:grpSpPr>
-      <p:sp>
-        <p:nvSpPr>
-          <p:cNvPr id="4" name="Title 3"/>
-          <p:cNvSpPr>
-            <a:spLocks noGrp="1"/>
-          </p:cNvSpPr>
-          <p:nvPr>
-            <p:ph type="title"/>
-          </p:nvPr>
-        </p:nvSpPr>
-        <p:spPr/>
-        <p:txBody>
-          <a:bodyPr>
-            <a:normAutofit fontScale="90000"/>
-          </a:bodyPr>
-          <a:lstStyle/>
-          <a:p>
-            <a:r>
-              <a:rPr lang="en-US" dirty="0"/>
-              <a:t>Defining Zero Downtime for Databases</a:t>
-            </a:r>
-          </a:p>
-        </p:txBody>
-      </p:sp>
-    </p:spTree>
-    <p:extLst>
-      <p:ext uri="{BB962C8B-B14F-4D97-AF65-F5344CB8AC3E}">
-        <p14:creationId xmlns:p14="http://schemas.microsoft.com/office/powerpoint/2010/main" val="1631803677"/>
-      </p:ext>
-    </p:extLst>
-  </p:cSld>
-  <p:clrMapOvr>
-    <a:masterClrMapping/>
-  </p:clrMapOvr>
-</p:sld>
-</file>
-
-<file path=ppt/slides/slide40.xml><?xml version="1.0" encoding="utf-8"?>
+<file path=ppt/slides/slide42.xml><?xml version="1.0" encoding="utf-8"?>
 <p:sld xmlns:a="http://schemas.openxmlformats.org/drawingml/2006/main" xmlns:r="http://schemas.openxmlformats.org/officeDocument/2006/relationships" xmlns:p="http://schemas.openxmlformats.org/presentationml/2006/main">
   <p:cSld>
     <p:spTree>

</xml_diff>